<commit_message>
update sales lead presentation for dealers
</commit_message>
<xml_diff>
--- a/posdealers/presentations/sales/media/posdealer-sales-rollout.pptx
+++ b/posdealers/presentations/sales/media/posdealer-sales-rollout.pptx
@@ -6511,7 +6511,7 @@
               <a:latin typeface="Roboto" panose="02000000000000000000" pitchFamily="2" charset="0"/>
               <a:ea typeface="Roboto" panose="02000000000000000000" pitchFamily="2" charset="0"/>
             </a:rPr>
-            <a:t>Einladungs-E-Mail</a:t>
+            <a:t>Zugriffsrechte vorkonfigurieren (Surrogate)</a:t>
           </a:r>
         </a:p>
       </dgm:t>
@@ -6679,7 +6679,7 @@
               <a:latin typeface="Roboto" panose="02000000000000000000" pitchFamily="2" charset="0"/>
               <a:ea typeface="Roboto" panose="02000000000000000000" pitchFamily="2" charset="0"/>
             </a:rPr>
-            <a:t>Anfordern von Zugriffsrechten (Surrogation)</a:t>
+            <a:t>Surrogate = Zugriff auf das Betreiberkonto für den Rollout und für den Support </a:t>
           </a:r>
         </a:p>
       </dgm:t>
@@ -6781,6 +6781,45 @@
         <a:lstStyle/>
         <a:p>
           <a:endParaRPr lang="en-DE"/>
+        </a:p>
+      </dgm:t>
+    </dgm:pt>
+    <dgm:pt modelId="{2DB2FE62-004D-5B48-8041-186B54F131BB}">
+      <dgm:prSet phldrT="[Text]"/>
+      <dgm:spPr/>
+      <dgm:t>
+        <a:bodyPr/>
+        <a:lstStyle/>
+        <a:p>
+          <a:r>
+            <a:rPr lang="de-DE" dirty="0">
+              <a:latin typeface="Roboto" panose="02000000000000000000" pitchFamily="2" charset="0"/>
+              <a:ea typeface="Roboto" panose="02000000000000000000" pitchFamily="2" charset="0"/>
+            </a:rPr>
+            <a:t>Einladungs-E-Mail</a:t>
+          </a:r>
+        </a:p>
+      </dgm:t>
+    </dgm:pt>
+    <dgm:pt modelId="{A7840466-EE9F-5E49-802A-FA4596A9EBA3}" type="parTrans" cxnId="{64AD8B68-EA5C-1541-89B7-DEF922376EC6}">
+      <dgm:prSet/>
+      <dgm:spPr/>
+      <dgm:t>
+        <a:bodyPr/>
+        <a:lstStyle/>
+        <a:p>
+          <a:endParaRPr lang="en-GB"/>
+        </a:p>
+      </dgm:t>
+    </dgm:pt>
+    <dgm:pt modelId="{892A29A1-08E0-8E48-BDDF-1762CE664469}" type="sibTrans" cxnId="{64AD8B68-EA5C-1541-89B7-DEF922376EC6}">
+      <dgm:prSet/>
+      <dgm:spPr/>
+      <dgm:t>
+        <a:bodyPr/>
+        <a:lstStyle/>
+        <a:p>
+          <a:endParaRPr lang="en-GB"/>
         </a:p>
       </dgm:t>
     </dgm:pt>
@@ -6931,10 +6970,13 @@
     <dgm:cxn modelId="{31D2DC0D-C645-4A8F-BD2D-791BA058829D}" type="presOf" srcId="{1D659693-0E7A-4638-9B8A-23A860592A72}" destId="{67EE90C8-39C2-4B24-A6E2-73ED47BE406D}" srcOrd="0" destOrd="0" presId="urn:microsoft.com/office/officeart/2005/8/layout/hProcess4"/>
     <dgm:cxn modelId="{5D331F0E-96E0-4ED9-B4BD-7AE6B5393A2E}" type="presOf" srcId="{939A1577-2324-43EB-B7C5-B0BEC8FE22DE}" destId="{DD0A6EF8-9419-4735-9241-1BAB89D1DEB0}" srcOrd="0" destOrd="0" presId="urn:microsoft.com/office/officeart/2005/8/layout/hProcess4"/>
     <dgm:cxn modelId="{9F266C11-4F12-4715-BFC3-C05D1FFA9EBB}" type="presOf" srcId="{A4305718-53E2-4A7F-804A-6F3B3A68EDA1}" destId="{188C989C-C17C-4448-9807-3BC6ED139629}" srcOrd="1" destOrd="1" presId="urn:microsoft.com/office/officeart/2005/8/layout/hProcess4"/>
+    <dgm:cxn modelId="{633D9826-CC5B-4140-B5C4-FA4FDFB90F8C}" type="presOf" srcId="{2DB2FE62-004D-5B48-8041-186B54F131BB}" destId="{4BA1B2B1-C1B8-47F2-8C0E-ADA73BC9C811}" srcOrd="1" destOrd="2" presId="urn:microsoft.com/office/officeart/2005/8/layout/hProcess4"/>
     <dgm:cxn modelId="{CF1A5B2B-6757-4E79-8DEE-189266BA7C37}" type="presOf" srcId="{15D92C2D-5742-4574-B3E7-79598663529D}" destId="{FDF54E9C-0750-422B-BCCE-276BE25C71B1}" srcOrd="0" destOrd="0" presId="urn:microsoft.com/office/officeart/2005/8/layout/hProcess4"/>
     <dgm:cxn modelId="{50D9952B-0DAF-4F69-90DE-629AD4575039}" type="presOf" srcId="{626115E6-AD47-4869-966A-CE8E61220F0A}" destId="{4BA1B2B1-C1B8-47F2-8C0E-ADA73BC9C811}" srcOrd="1" destOrd="0" presId="urn:microsoft.com/office/officeart/2005/8/layout/hProcess4"/>
     <dgm:cxn modelId="{E4B85944-C4C9-475A-A222-B3E54630BC40}" type="presOf" srcId="{D690E6B1-ED93-4978-AC10-25C06B709E1D}" destId="{4BA1B2B1-C1B8-47F2-8C0E-ADA73BC9C811}" srcOrd="1" destOrd="1" presId="urn:microsoft.com/office/officeart/2005/8/layout/hProcess4"/>
     <dgm:cxn modelId="{D90BB746-0804-4898-BF96-356E2B873EAA}" srcId="{F0F6B17E-9533-4727-B3CC-A6D0466AC596}" destId="{939A1577-2324-43EB-B7C5-B0BEC8FE22DE}" srcOrd="2" destOrd="0" parTransId="{54852552-1083-4F9C-9B1F-503522ABD84C}" sibTransId="{5D2CC7DE-FDA6-4D6E-A5F3-358AE7439C44}"/>
+    <dgm:cxn modelId="{353B5355-8A24-BD4B-8992-6160B394A1BC}" type="presOf" srcId="{2DB2FE62-004D-5B48-8041-186B54F131BB}" destId="{B02BE0EB-C330-4F32-8D7C-9CA39266E853}" srcOrd="0" destOrd="2" presId="urn:microsoft.com/office/officeart/2005/8/layout/hProcess4"/>
+    <dgm:cxn modelId="{64AD8B68-EA5C-1541-89B7-DEF922376EC6}" srcId="{A127E4B3-65AD-4248-95B2-95D5289D7EA9}" destId="{2DB2FE62-004D-5B48-8041-186B54F131BB}" srcOrd="2" destOrd="0" parTransId="{A7840466-EE9F-5E49-802A-FA4596A9EBA3}" sibTransId="{892A29A1-08E0-8E48-BDDF-1762CE664469}"/>
     <dgm:cxn modelId="{7AF1A46B-8C9C-49F7-A8C3-D781ADC1DF61}" srcId="{939A1577-2324-43EB-B7C5-B0BEC8FE22DE}" destId="{EAAEEAC4-C2C6-4028-807F-BC6BBE918253}" srcOrd="0" destOrd="0" parTransId="{292A3486-B733-4327-90E8-F23FDDCC573D}" sibTransId="{161BD47E-7386-4BB1-8A0E-FA4BBD79F0B5}"/>
     <dgm:cxn modelId="{AC0A3E75-DFB3-48EF-9626-AFA919C3ACD5}" type="presOf" srcId="{15D92C2D-5742-4574-B3E7-79598663529D}" destId="{188C989C-C17C-4448-9807-3BC6ED139629}" srcOrd="1" destOrd="0" presId="urn:microsoft.com/office/officeart/2005/8/layout/hProcess4"/>
     <dgm:cxn modelId="{011F547E-6C54-49FB-AD63-F6A700C9F57B}" srcId="{A127E4B3-65AD-4248-95B2-95D5289D7EA9}" destId="{626115E6-AD47-4869-966A-CE8E61220F0A}" srcOrd="0" destOrd="0" parTransId="{3403EA9F-FE87-4C1D-9769-729877F19A03}" sibTransId="{BF0B59F1-50F3-42AA-B12F-CBB0F79E4BC3}"/>
@@ -7047,12 +7089,12 @@
         <a:fontRef idx="minor"/>
       </dsp:style>
       <dsp:txBody>
-        <a:bodyPr spcFirstLastPara="0" vert="horz" wrap="square" lIns="28575" tIns="28575" rIns="28575" bIns="28575" numCol="1" spcCol="1270" anchor="t" anchorCtr="0">
+        <a:bodyPr spcFirstLastPara="0" vert="horz" wrap="square" lIns="26670" tIns="26670" rIns="26670" bIns="26670" numCol="1" spcCol="1270" anchor="t" anchorCtr="0">
           <a:noAutofit/>
         </a:bodyPr>
         <a:lstStyle/>
         <a:p>
-          <a:pPr marL="114300" lvl="1" indent="-114300" algn="l" defTabSz="666750">
+          <a:pPr marL="114300" lvl="1" indent="-114300" algn="l" defTabSz="622300">
             <a:lnSpc>
               <a:spcPct val="90000"/>
             </a:lnSpc>
@@ -7065,7 +7107,7 @@
             <a:buChar char="•"/>
           </a:pPr>
           <a:r>
-            <a:rPr lang="de-DE" sz="1500" kern="1200" dirty="0">
+            <a:rPr lang="de-DE" sz="1400" kern="1200" dirty="0">
               <a:latin typeface="Roboto" panose="02000000000000000000" pitchFamily="2" charset="0"/>
               <a:ea typeface="Roboto" panose="02000000000000000000" pitchFamily="2" charset="0"/>
             </a:rPr>
@@ -7073,7 +7115,7 @@
           </a:r>
         </a:p>
         <a:p>
-          <a:pPr marL="114300" lvl="1" indent="-114300" algn="l" defTabSz="666750">
+          <a:pPr marL="114300" lvl="1" indent="-114300" algn="l" defTabSz="622300">
             <a:lnSpc>
               <a:spcPct val="90000"/>
             </a:lnSpc>
@@ -7086,7 +7128,28 @@
             <a:buChar char="•"/>
           </a:pPr>
           <a:r>
-            <a:rPr lang="de-DE" sz="1500" kern="1200" dirty="0">
+            <a:rPr lang="de-DE" sz="1400" kern="1200" dirty="0">
+              <a:latin typeface="Roboto" panose="02000000000000000000" pitchFamily="2" charset="0"/>
+              <a:ea typeface="Roboto" panose="02000000000000000000" pitchFamily="2" charset="0"/>
+            </a:rPr>
+            <a:t>Zugriffsrechte vorkonfigurieren (Surrogate)</a:t>
+          </a:r>
+        </a:p>
+        <a:p>
+          <a:pPr marL="114300" lvl="1" indent="-114300" algn="l" defTabSz="622300">
+            <a:lnSpc>
+              <a:spcPct val="90000"/>
+            </a:lnSpc>
+            <a:spcBef>
+              <a:spcPct val="0"/>
+            </a:spcBef>
+            <a:spcAft>
+              <a:spcPct val="15000"/>
+            </a:spcAft>
+            <a:buChar char="•"/>
+          </a:pPr>
+          <a:r>
+            <a:rPr lang="de-DE" sz="1400" kern="1200" dirty="0">
               <a:latin typeface="Roboto" panose="02000000000000000000" pitchFamily="2" charset="0"/>
               <a:ea typeface="Roboto" panose="02000000000000000000" pitchFamily="2" charset="0"/>
             </a:rPr>
@@ -7270,12 +7333,12 @@
         <a:fontRef idx="minor"/>
       </dsp:style>
       <dsp:txBody>
-        <a:bodyPr spcFirstLastPara="0" vert="horz" wrap="square" lIns="28575" tIns="28575" rIns="28575" bIns="28575" numCol="1" spcCol="1270" anchor="t" anchorCtr="0">
+        <a:bodyPr spcFirstLastPara="0" vert="horz" wrap="square" lIns="26670" tIns="26670" rIns="26670" bIns="26670" numCol="1" spcCol="1270" anchor="t" anchorCtr="0">
           <a:noAutofit/>
         </a:bodyPr>
         <a:lstStyle/>
         <a:p>
-          <a:pPr marL="114300" lvl="1" indent="-114300" algn="l" defTabSz="666750">
+          <a:pPr marL="114300" lvl="1" indent="-114300" algn="l" defTabSz="622300">
             <a:lnSpc>
               <a:spcPct val="90000"/>
             </a:lnSpc>
@@ -7288,7 +7351,7 @@
             <a:buChar char="•"/>
           </a:pPr>
           <a:r>
-            <a:rPr lang="de-DE" sz="1500" kern="1200" dirty="0">
+            <a:rPr lang="de-DE" sz="1400" kern="1200" dirty="0">
               <a:latin typeface="Roboto" panose="02000000000000000000" pitchFamily="2" charset="0"/>
               <a:ea typeface="Roboto" panose="02000000000000000000" pitchFamily="2" charset="0"/>
             </a:rPr>
@@ -7296,7 +7359,7 @@
           </a:r>
         </a:p>
         <a:p>
-          <a:pPr marL="114300" lvl="1" indent="-114300" algn="l" defTabSz="666750">
+          <a:pPr marL="114300" lvl="1" indent="-114300" algn="l" defTabSz="622300">
             <a:lnSpc>
               <a:spcPct val="90000"/>
             </a:lnSpc>
@@ -7309,7 +7372,7 @@
             <a:buChar char="•"/>
           </a:pPr>
           <a:r>
-            <a:rPr lang="de-DE" sz="1500" kern="1200" dirty="0">
+            <a:rPr lang="de-DE" sz="1400" kern="1200" dirty="0">
               <a:latin typeface="Roboto" panose="02000000000000000000" pitchFamily="2" charset="0"/>
               <a:ea typeface="Roboto" panose="02000000000000000000" pitchFamily="2" charset="0"/>
             </a:rPr>
@@ -7317,7 +7380,7 @@
           </a:r>
         </a:p>
         <a:p>
-          <a:pPr marL="114300" lvl="1" indent="-114300" algn="l" defTabSz="666750">
+          <a:pPr marL="114300" lvl="1" indent="-114300" algn="l" defTabSz="622300">
             <a:lnSpc>
               <a:spcPct val="90000"/>
             </a:lnSpc>
@@ -7330,7 +7393,7 @@
             <a:buChar char="•"/>
           </a:pPr>
           <a:r>
-            <a:rPr lang="de-DE" sz="1500" kern="1200" dirty="0">
+            <a:rPr lang="de-DE" sz="1400" kern="1200" dirty="0">
               <a:latin typeface="Roboto" panose="02000000000000000000" pitchFamily="2" charset="0"/>
               <a:ea typeface="Roboto" panose="02000000000000000000" pitchFamily="2" charset="0"/>
             </a:rPr>
@@ -7514,12 +7577,12 @@
         <a:fontRef idx="minor"/>
       </dsp:style>
       <dsp:txBody>
-        <a:bodyPr spcFirstLastPara="0" vert="horz" wrap="square" lIns="28575" tIns="28575" rIns="28575" bIns="28575" numCol="1" spcCol="1270" anchor="t" anchorCtr="0">
+        <a:bodyPr spcFirstLastPara="0" vert="horz" wrap="square" lIns="26670" tIns="26670" rIns="26670" bIns="26670" numCol="1" spcCol="1270" anchor="t" anchorCtr="0">
           <a:noAutofit/>
         </a:bodyPr>
         <a:lstStyle/>
         <a:p>
-          <a:pPr marL="114300" lvl="1" indent="-114300" algn="l" defTabSz="666750">
+          <a:pPr marL="114300" lvl="1" indent="-114300" algn="l" defTabSz="622300">
             <a:lnSpc>
               <a:spcPct val="90000"/>
             </a:lnSpc>
@@ -7532,11 +7595,11 @@
             <a:buChar char="•"/>
           </a:pPr>
           <a:r>
-            <a:rPr lang="de-DE" sz="1500" kern="1200" dirty="0">
+            <a:rPr lang="de-DE" sz="1400" kern="1200" dirty="0">
               <a:latin typeface="Roboto" panose="02000000000000000000" pitchFamily="2" charset="0"/>
               <a:ea typeface="Roboto" panose="02000000000000000000" pitchFamily="2" charset="0"/>
             </a:rPr>
-            <a:t>Anfordern von Zugriffsrechten (Surrogation)</a:t>
+            <a:t>Surrogate = Zugriff auf das Betreiberkonto für den Rollout und für den Support </a:t>
           </a:r>
         </a:p>
       </dsp:txBody>
@@ -9287,7 +9350,7 @@
           <a:p>
             <a:fld id="{878DCA2D-ADC9-4D7A-A916-9A90AC8F3FDD}" type="datetimeFigureOut">
               <a:rPr lang="de-DE" smtClean="0"/>
-              <a:t>13.10.20</a:t>
+              <a:t>25.05.21</a:t>
             </a:fld>
             <a:endParaRPr lang="de-DE"/>
           </a:p>
@@ -9686,62 +9749,84 @@
           <a:bodyPr/>
           <a:lstStyle/>
           <a:p>
-            <a:r>
-              <a:rPr lang="de-DE" noProof="0" dirty="0"/>
-              <a:t>Eine Kasse mit integrierter Middleware sendet Belegdaten an die Queue. Die Queue erhält zudem über die SCU die TSE TAR Files aus der TSE. Die Queue sendet die Belegdaten und TSE TAR Files automatisch an das </a:t>
-            </a:r>
-            <a:r>
-              <a:rPr lang="de-DE" noProof="0" dirty="0" err="1"/>
-              <a:t>POSArchiv</a:t>
-            </a:r>
-            <a:r>
-              <a:rPr lang="de-DE" noProof="0" dirty="0"/>
-              <a:t>. Das </a:t>
-            </a:r>
-            <a:r>
-              <a:rPr lang="de-DE" noProof="0" dirty="0" err="1"/>
-              <a:t>POSArchiv</a:t>
-            </a:r>
-            <a:r>
-              <a:rPr lang="de-DE" noProof="0" dirty="0"/>
-              <a:t> sendet mit Hilfe von Server zu Server Übertragung die Daten automatisch an AKO (DSFinV-K + TAR) und an DATEV (DFKA Format). </a:t>
-            </a:r>
-          </a:p>
-          <a:p>
-            <a:r>
-              <a:rPr lang="de-DE" noProof="0" dirty="0"/>
-              <a:t>Der Betreiber einer Kasse ohne integrierter Middleware hat die Möglichkeit Daten manuell ins AKO hochzuladen (auch über die Händler-Website möglich). Alternativ kann das Kassensystem oder ein anderes Programm Daten über die AKO API ins AKO automatisch hochladen. Auch der Betreiber einer Kasse mit integrierter Middleware hat die Möglichkeit Daten manuell hochzuladen (PDF Dateien, z.B. Menükarten, Verfahrensdokumentation). Der Steuerberater hat Zugriff auf AKO Dateien indem der Betreiber Daten freigibt und dem Steuerberater einen Link mit Token für den Zugriff sendet. Um auf das </a:t>
-            </a:r>
-            <a:r>
-              <a:rPr lang="de-DE" noProof="0" dirty="0" err="1"/>
-              <a:t>POSArchiv</a:t>
-            </a:r>
-            <a:r>
-              <a:rPr lang="de-DE" noProof="0" dirty="0"/>
-              <a:t> Zugriff zu erlangen muss der Steuerberater im </a:t>
-            </a:r>
-            <a:r>
-              <a:rPr lang="de-DE" noProof="0" dirty="0" err="1"/>
-              <a:t>ft.Portal</a:t>
-            </a:r>
-            <a:r>
-              <a:rPr lang="de-DE" noProof="0" dirty="0"/>
-              <a:t> registriert werden (Rolle: Berater) und mit dem Betreiber verknüpft werden. Dieser kann daraufhin eine Datenfreigabe für den Berater aktivieren.</a:t>
-            </a:r>
-          </a:p>
-          <a:p>
-            <a:r>
-              <a:rPr lang="de-DE" noProof="0" dirty="0"/>
-              <a:t>In einem Hybridszenario (Kassen mit und Kassen ohne ft.Middleware) zum Beispiel können alle Daten der Kassen ohne ft.Middleware manuell oder per API ins AKO hochgeladen werden. Die Daten (Belegdaten + TSE TAR) der Kassen mit ft.Middleware werden automatisch hochgeladen, daraus entstehen die DSFinV-K und TSE TAR Files im </a:t>
-            </a:r>
-            <a:r>
-              <a:rPr lang="de-DE" noProof="0" dirty="0" err="1"/>
-              <a:t>POSArchiv</a:t>
-            </a:r>
-            <a:r>
-              <a:rPr lang="de-DE" noProof="0" dirty="0"/>
-              <a:t>, die dann ins AKO gelegt werden. So gelangen alle Daten der Filiale in diesem Hybridszenario im AKO.</a:t>
-            </a:r>
+            <a:pPr>
+              <a:buFont typeface="Arial" panose="020B0604020202020204" pitchFamily="34" charset="0"/>
+              <a:buChar char="•"/>
+            </a:pPr>
+            <a:r>
+              <a:rPr lang="de-DE" dirty="0"/>
+              <a:t> Kann nur für Kassen eingesetzt werden, die die fiskaltrust.Middleware benutzen.</a:t>
+            </a:r>
+          </a:p>
+          <a:p>
+            <a:pPr>
+              <a:buFont typeface="Arial" panose="020B0604020202020204" pitchFamily="34" charset="0"/>
+              <a:buChar char="•"/>
+            </a:pPr>
+            <a:r>
+              <a:rPr lang="de-DE" dirty="0"/>
+              <a:t> Sendet automatisiert Meldungen an das Finanzamt sobald erforderlich (Anmelden Kasse-&gt;TSE, Ummelden Kasse-&gt;TSE, Abmelden Kasse-&gt;TSE)</a:t>
+            </a:r>
+            <a:endParaRPr lang="de-DE" dirty="0">
+              <a:cs typeface="Calibri"/>
+            </a:endParaRPr>
+          </a:p>
+          <a:p>
+            <a:pPr>
+              <a:buFont typeface="Arial" panose="020B0604020202020204" pitchFamily="34" charset="0"/>
+              <a:buChar char="•"/>
+            </a:pPr>
+            <a:r>
+              <a:rPr lang="de-DE" dirty="0"/>
+              <a:t> Wird </a:t>
+            </a:r>
+            <a:r>
+              <a:rPr lang="de-DE" b="1" dirty="0"/>
+              <a:t>pro Kasse </a:t>
+            </a:r>
+            <a:r>
+              <a:rPr lang="de-DE" dirty="0"/>
+              <a:t>angeboten</a:t>
+            </a:r>
+            <a:endParaRPr lang="de-DE" dirty="0">
+              <a:cs typeface="Calibri" panose="020F0502020204030204"/>
+            </a:endParaRPr>
+          </a:p>
+          <a:p>
+            <a:pPr>
+              <a:buFont typeface="Arial" panose="020B0604020202020204" pitchFamily="34" charset="0"/>
+              <a:buChar char="•"/>
+            </a:pPr>
+            <a:endParaRPr lang="de-DE" dirty="0">
+              <a:cs typeface="Calibri" panose="020F0502020204030204"/>
+            </a:endParaRPr>
+          </a:p>
+          <a:p>
+            <a:r>
+              <a:rPr lang="de-DE" dirty="0">
+                <a:cs typeface="Calibri" panose="020F0502020204030204"/>
+              </a:rPr>
+              <a:t>Vorteile:</a:t>
+            </a:r>
+          </a:p>
+          <a:p>
+            <a:r>
+              <a:rPr lang="de-DE" dirty="0">
+                <a:cs typeface="Calibri" panose="020F0502020204030204"/>
+              </a:rPr>
+              <a:t>- Zeit und Kosteneinsparung (z.B. Steuerberaterkosten)</a:t>
+            </a:r>
+          </a:p>
+          <a:p>
+            <a:r>
+              <a:rPr lang="de-DE" dirty="0">
+                <a:cs typeface="Calibri" panose="020F0502020204030204"/>
+              </a:rPr>
+              <a:t>- Automatisierter Prozess dadurch kommt kein Versäumnis oder Verspätung zu Stande</a:t>
+            </a:r>
+          </a:p>
+          <a:p>
+            <a:endParaRPr lang="en-US" dirty="0"/>
           </a:p>
         </p:txBody>
       </p:sp>
@@ -9762,7 +9847,7 @@
           <a:p>
             <a:fld id="{87FB5468-8034-4A81-91AF-9E789D7C7320}" type="slidenum">
               <a:rPr lang="de-DE" smtClean="0"/>
-              <a:t>13</a:t>
+              <a:t>11</a:t>
             </a:fld>
             <a:endParaRPr lang="de-DE"/>
           </a:p>
@@ -9771,7 +9856,7 @@
     </p:spTree>
     <p:extLst>
       <p:ext uri="{BB962C8B-B14F-4D97-AF65-F5344CB8AC3E}">
-        <p14:creationId xmlns:p14="http://schemas.microsoft.com/office/powerpoint/2010/main" val="3251830567"/>
+        <p14:creationId xmlns:p14="http://schemas.microsoft.com/office/powerpoint/2010/main" val="756636306"/>
       </p:ext>
     </p:extLst>
   </p:cSld>
@@ -9831,7 +9916,7 @@
             </a:pPr>
             <a:r>
               <a:rPr lang="de-DE" dirty="0"/>
-              <a:t> Kann nur für Kassen eingesetzt werden, die die fiskaltrust.Middleware benutzen.</a:t>
+              <a:t> Unabhängig vom Einsatz der fiskaltrust.Middleware</a:t>
             </a:r>
           </a:p>
           <a:p>
@@ -9841,11 +9926,16 @@
             </a:pPr>
             <a:r>
               <a:rPr lang="de-DE" dirty="0"/>
-              <a:t> Sendet automatisiert Meldungen an das Finanzamt sobald erforderlich.</a:t>
-            </a:r>
-            <a:endParaRPr lang="de-DE" dirty="0">
-              <a:cs typeface="Calibri"/>
-            </a:endParaRPr>
+              <a:t> Sorgt für die revisionssichere Archivierung </a:t>
+            </a:r>
+            <a:r>
+              <a:rPr lang="de-DE" b="1" dirty="0"/>
+              <a:t>manuell</a:t>
+            </a:r>
+            <a:r>
+              <a:rPr lang="de-DE" dirty="0"/>
+              <a:t> hochgeladener Daten (DSFinV-K, TSE TAR Files, PDF Dateien).</a:t>
+            </a:r>
           </a:p>
           <a:p>
             <a:pPr>
@@ -9854,19 +9944,124 @@
             </a:pPr>
             <a:r>
               <a:rPr lang="de-DE" dirty="0"/>
-              <a:t>  Wird </a:t>
-            </a:r>
-            <a:r>
-              <a:rPr lang="de-DE" b="1" dirty="0"/>
-              <a:t>pro Kasse </a:t>
-            </a:r>
+              <a:t> Bietet eine API zur Automatisierung des Upload</a:t>
+            </a:r>
+            <a:endParaRPr lang="de-DE" dirty="0">
+              <a:cs typeface="Calibri"/>
+            </a:endParaRPr>
+          </a:p>
+          <a:p>
+            <a:pPr>
+              <a:buFont typeface="Arial" panose="020B0604020202020204" pitchFamily="34" charset="0"/>
+              <a:buChar char="•"/>
+            </a:pPr>
             <a:r>
               <a:rPr lang="de-DE" dirty="0"/>
-              <a:t>angeboten</a:t>
+              <a:t> Die </a:t>
+            </a:r>
+            <a:r>
+              <a:rPr lang="de-DE" dirty="0" err="1"/>
+              <a:t>Uploadfunktionalität</a:t>
+            </a:r>
+            <a:r>
+              <a:rPr lang="de-DE" dirty="0"/>
+              <a:t> (File-Drop) ist auch als HTML Komponente leicht in die Webseite des Händlers integrierbar. Fiskaltrust stellt über </a:t>
+            </a:r>
+            <a:r>
+              <a:rPr lang="de-DE" dirty="0" err="1"/>
+              <a:t>github</a:t>
+            </a:r>
+            <a:r>
+              <a:rPr lang="de-DE" dirty="0"/>
+              <a:t> ein Source-Code Beispiel (HTML und JS) zur Verfügung. </a:t>
             </a:r>
             <a:endParaRPr lang="de-DE" dirty="0">
               <a:cs typeface="Calibri" panose="020F0502020204030204"/>
             </a:endParaRPr>
+          </a:p>
+          <a:p>
+            <a:pPr>
+              <a:buFont typeface="Arial" panose="020B0604020202020204" pitchFamily="34" charset="0"/>
+              <a:buChar char="•"/>
+            </a:pPr>
+            <a:r>
+              <a:rPr lang="de-DE" dirty="0">
+                <a:cs typeface="Calibri" panose="020F0502020204030204"/>
+              </a:rPr>
+              <a:t> DSFinV-K und TSE TAR Files können ohne Login/Authentifizierung hochgeladen werden. Hierbei erkennt das AKO aus dem Inhalt der Files wie diese zugeordnet müssen. </a:t>
+            </a:r>
+          </a:p>
+          <a:p>
+            <a:pPr>
+              <a:buFont typeface="Arial" panose="020B0604020202020204" pitchFamily="34" charset="0"/>
+              <a:buChar char="•"/>
+            </a:pPr>
+            <a:r>
+              <a:rPr lang="de-DE" dirty="0">
+                <a:cs typeface="Calibri" panose="020F0502020204030204"/>
+              </a:rPr>
+              <a:t> Dadurch ist die Nutzung (der Upload) auch vor der Registrierung/Kauf möglich. Für den Zugriff auf die Daten muss das Produkt gekauft werden. </a:t>
+            </a:r>
+          </a:p>
+          <a:p>
+            <a:pPr>
+              <a:buFont typeface="Arial" panose="020B0604020202020204" pitchFamily="34" charset="0"/>
+              <a:buChar char="•"/>
+            </a:pPr>
+            <a:r>
+              <a:rPr lang="de-DE" dirty="0">
+                <a:cs typeface="Calibri" panose="020F0502020204030204"/>
+              </a:rPr>
+              <a:t> Mandantenfähiger</a:t>
+            </a:r>
+            <a:r>
+              <a:rPr lang="de-DE" dirty="0"/>
+              <a:t> Zugriff über WEB Portal</a:t>
+            </a:r>
+            <a:endParaRPr lang="de-DE" dirty="0">
+              <a:cs typeface="Calibri"/>
+            </a:endParaRPr>
+          </a:p>
+          <a:p>
+            <a:pPr>
+              <a:buFont typeface="Arial" panose="020B0604020202020204" pitchFamily="34" charset="0"/>
+              <a:buChar char="•"/>
+            </a:pPr>
+            <a:r>
+              <a:rPr lang="de-DE" dirty="0"/>
+              <a:t> Hochgeladene, externe DSFinV-K Dateien werden technisch validiert</a:t>
+            </a:r>
+          </a:p>
+          <a:p>
+            <a:pPr>
+              <a:buFont typeface="Arial" panose="020B0604020202020204" pitchFamily="34" charset="0"/>
+              <a:buChar char="•"/>
+            </a:pPr>
+            <a:r>
+              <a:rPr lang="de-DE" dirty="0"/>
+              <a:t>  Kann auch für Kassen eingesetzt werden, die die fiskaltrust.Middleware benutzen um PDF Dateien revisionssicher zu Archivieren (Verfahrensdokumentation, Speisekarten, etc.)</a:t>
+            </a:r>
+            <a:endParaRPr lang="de-DE" dirty="0">
+              <a:cs typeface="Calibri"/>
+            </a:endParaRPr>
+          </a:p>
+          <a:p>
+            <a:pPr>
+              <a:buFont typeface="Arial" panose="020B0604020202020204" pitchFamily="34" charset="0"/>
+              <a:buChar char="•"/>
+            </a:pPr>
+            <a:r>
+              <a:rPr lang="de-DE" dirty="0"/>
+              <a:t> Wird </a:t>
+            </a:r>
+            <a:r>
+              <a:rPr lang="de-DE" b="1" dirty="0"/>
+              <a:t>pro Filiale </a:t>
+            </a:r>
+            <a:r>
+              <a:rPr lang="de-DE" dirty="0"/>
+              <a:t>angeboten - deckt also alle Kassen der Filiale ab</a:t>
+            </a:r>
           </a:p>
           <a:p>
             <a:pPr>
@@ -9874,35 +10069,122 @@
               <a:buChar char="•"/>
             </a:pPr>
             <a:endParaRPr lang="de-DE" dirty="0">
+              <a:cs typeface="Calibri"/>
+            </a:endParaRPr>
+          </a:p>
+          <a:p>
+            <a:r>
+              <a:rPr lang="de-DE" dirty="0">
+                <a:cs typeface="Calibri"/>
+              </a:rPr>
+              <a:t>Vorteile:</a:t>
+            </a:r>
+          </a:p>
+          <a:p>
+            <a:pPr marL="171450" indent="-171450">
+              <a:buFont typeface="Arial,Sans-Serif"/>
+              <a:buChar char="•"/>
+            </a:pPr>
+            <a:r>
+              <a:rPr lang="de-DE" dirty="0">
+                <a:cs typeface="Calibri"/>
+              </a:rPr>
+              <a:t>Einfacher Upload der Daten</a:t>
+            </a:r>
+            <a:endParaRPr lang="de-DE" dirty="0"/>
+          </a:p>
+          <a:p>
+            <a:pPr marL="171450" indent="-171450">
+              <a:buFont typeface="Arial,Sans-Serif"/>
+              <a:buChar char="•"/>
+            </a:pPr>
+            <a:r>
+              <a:rPr lang="de-DE" dirty="0">
+                <a:cs typeface="Calibri"/>
+              </a:rPr>
+              <a:t>Händler-Branding und attraktiv in der Preisgestaltung</a:t>
+            </a:r>
+            <a:endParaRPr lang="de-DE" dirty="0"/>
+          </a:p>
+          <a:p>
+            <a:pPr marL="171450" indent="-171450">
+              <a:buFont typeface="Arial,Sans-Serif"/>
+              <a:buChar char="•"/>
+            </a:pPr>
+            <a:r>
+              <a:rPr lang="de-DE" dirty="0"/>
+              <a:t>Unabhängig von der eingesetzten </a:t>
+            </a:r>
+            <a:r>
+              <a:rPr lang="de-DE" dirty="0" err="1"/>
+              <a:t>Fiskalisierungslösung</a:t>
+            </a:r>
+            <a:endParaRPr lang="de-DE" dirty="0"/>
+          </a:p>
+          <a:p>
+            <a:pPr marL="171450" indent="-171450">
+              <a:buFont typeface="Arial,Sans-Serif"/>
+              <a:buChar char="•"/>
+            </a:pPr>
+            <a:r>
+              <a:rPr lang="de-DE" dirty="0">
+                <a:cs typeface="Calibri"/>
+              </a:rPr>
+              <a:t>Akzeptiert PDF Dateien (Verfahrensdokumentation, Speisekarten, etc.)</a:t>
+            </a:r>
+            <a:endParaRPr lang="de-DE" dirty="0"/>
+          </a:p>
+          <a:p>
+            <a:pPr marL="171450" indent="-171450">
+              <a:buFont typeface="Arial,Sans-Serif"/>
+              <a:buChar char="•"/>
+            </a:pPr>
+            <a:r>
+              <a:rPr lang="de-DE" dirty="0"/>
+              <a:t>Nachweis der Ordnungsmäßigkeit gegenüber der Finanzverwaltung</a:t>
+            </a:r>
+            <a:endParaRPr lang="de-DE" dirty="0">
               <a:cs typeface="Calibri" panose="020F0502020204030204"/>
             </a:endParaRPr>
           </a:p>
           <a:p>
-            <a:r>
-              <a:rPr lang="de-DE" dirty="0">
-                <a:cs typeface="Calibri" panose="020F0502020204030204"/>
-              </a:rPr>
-              <a:t>Vorteile:</a:t>
-            </a:r>
-          </a:p>
-          <a:p>
-            <a:r>
-              <a:rPr lang="de-DE" dirty="0">
-                <a:cs typeface="Calibri" panose="020F0502020204030204"/>
-              </a:rPr>
-              <a:t>- Zeit und Kosteneinsparung (z.B. Steuerberaterkosten)</a:t>
-            </a:r>
-          </a:p>
-          <a:p>
-            <a:r>
-              <a:rPr lang="de-DE" dirty="0">
-                <a:cs typeface="Calibri" panose="020F0502020204030204"/>
-              </a:rPr>
-              <a:t>- Automatisierter Prozess dadurch kommt kein Versäumnis oder Verspätung zu Stande</a:t>
-            </a:r>
-          </a:p>
-          <a:p>
-            <a:endParaRPr lang="en-US" dirty="0"/>
+            <a:pPr marL="171450" indent="-171450">
+              <a:buFont typeface="Arial,Sans-Serif"/>
+              <a:buChar char="•"/>
+            </a:pPr>
+            <a:r>
+              <a:rPr lang="de-DE" dirty="0"/>
+              <a:t>Lösung für begrenzten Speicherplatz in Kassensystem und/oder TSE</a:t>
+            </a:r>
+            <a:endParaRPr lang="de-DE" dirty="0">
+              <a:cs typeface="Calibri" panose="020F0502020204030204"/>
+            </a:endParaRPr>
+          </a:p>
+          <a:p>
+            <a:pPr marL="171450" indent="-171450">
+              <a:buFont typeface="Arial,Sans-Serif"/>
+              <a:buChar char="•"/>
+            </a:pPr>
+            <a:r>
+              <a:rPr lang="de-DE" dirty="0"/>
+              <a:t>Vereinfachter Zugriff durch zentralisierte Datenhaltung</a:t>
+            </a:r>
+            <a:endParaRPr lang="de-DE" dirty="0">
+              <a:cs typeface="Calibri" panose="020F0502020204030204"/>
+            </a:endParaRPr>
+          </a:p>
+          <a:p>
+            <a:pPr marL="171450" indent="-171450">
+              <a:buFont typeface="Arial,Sans-Serif"/>
+              <a:buChar char="•"/>
+            </a:pPr>
+            <a:r>
+              <a:rPr lang="de-DE" dirty="0"/>
+              <a:t>Möglicher Wegfall der Verpflichtung alte Kassensysteme bzw. TSEs über die Dauer der Aufbewahrungspflicht vorzuhalten. </a:t>
+            </a:r>
+            <a:endParaRPr lang="de-DE" dirty="0">
+              <a:cs typeface="Calibri"/>
+            </a:endParaRPr>
           </a:p>
         </p:txBody>
       </p:sp>
@@ -9923,7 +10205,7 @@
           <a:p>
             <a:fld id="{87FB5468-8034-4A81-91AF-9E789D7C7320}" type="slidenum">
               <a:rPr lang="de-DE" smtClean="0"/>
-              <a:t>14</a:t>
+              <a:t>12</a:t>
             </a:fld>
             <a:endParaRPr lang="de-DE"/>
           </a:p>
@@ -9932,7 +10214,7 @@
     </p:spTree>
     <p:extLst>
       <p:ext uri="{BB962C8B-B14F-4D97-AF65-F5344CB8AC3E}">
-        <p14:creationId xmlns:p14="http://schemas.microsoft.com/office/powerpoint/2010/main" val="4061718064"/>
+        <p14:creationId xmlns:p14="http://schemas.microsoft.com/office/powerpoint/2010/main" val="3771762237"/>
       </p:ext>
     </p:extLst>
   </p:cSld>
@@ -9986,127 +10268,62 @@
           <a:bodyPr/>
           <a:lstStyle/>
           <a:p>
-            <a:pPr marL="0" indent="0">
-              <a:buNone/>
-            </a:pPr>
-            <a:r>
-              <a:rPr lang="de-DE" dirty="0"/>
-              <a:t> </a:t>
-            </a:r>
-            <a:r>
-              <a:rPr lang="de-DE" u="sng" dirty="0"/>
-              <a:t>Beinhaltet</a:t>
-            </a:r>
-            <a:r>
-              <a:rPr lang="de-DE" dirty="0"/>
-              <a:t>:</a:t>
-            </a:r>
-          </a:p>
-          <a:p>
-            <a:pPr marL="0" indent="0">
-              <a:buNone/>
-            </a:pPr>
-            <a:endParaRPr lang="de-DE" dirty="0"/>
-          </a:p>
-          <a:p>
-            <a:pPr>
-              <a:buFont typeface="Arial" panose="020B0604020202020204" pitchFamily="34" charset="0"/>
-              <a:buChar char="•"/>
-            </a:pPr>
-            <a:r>
-              <a:rPr lang="de-DE" dirty="0"/>
-              <a:t> POS Archiv (</a:t>
-            </a:r>
-            <a:r>
-              <a:rPr lang="de-DE" dirty="0" err="1"/>
-              <a:t>max</a:t>
-            </a:r>
-            <a:r>
-              <a:rPr lang="de-DE" dirty="0"/>
-              <a:t> 25 Kassen)</a:t>
-            </a:r>
-            <a:endParaRPr lang="de-DE" dirty="0">
-              <a:cs typeface="Calibri"/>
-            </a:endParaRPr>
-          </a:p>
-          <a:p>
-            <a:pPr>
-              <a:buFont typeface="Arial" panose="020B0604020202020204" pitchFamily="34" charset="0"/>
-              <a:buChar char="•"/>
-            </a:pPr>
-            <a:r>
-              <a:rPr lang="de-DE" dirty="0"/>
-              <a:t> AKO (</a:t>
-            </a:r>
-            <a:r>
-              <a:rPr lang="de-DE" dirty="0" err="1"/>
-              <a:t>Audicon</a:t>
-            </a:r>
-            <a:r>
-              <a:rPr lang="de-DE" dirty="0"/>
-              <a:t> Kassenarchiv Online)</a:t>
-            </a:r>
-          </a:p>
-          <a:p>
-            <a:pPr>
-              <a:buFont typeface="Arial" panose="020B0604020202020204" pitchFamily="34" charset="0"/>
-              <a:buChar char="•"/>
-            </a:pPr>
-            <a:r>
-              <a:rPr lang="de-DE" dirty="0"/>
-              <a:t> und automatische </a:t>
-            </a:r>
-            <a:r>
-              <a:rPr lang="de-DE" dirty="0" err="1"/>
-              <a:t>Finanzamtmeldungen</a:t>
-            </a:r>
-            <a:endParaRPr lang="de-DE" dirty="0"/>
-          </a:p>
-          <a:p>
-            <a:pPr>
-              <a:buFont typeface="Arial" panose="020B0604020202020204" pitchFamily="34" charset="0"/>
-              <a:buChar char="•"/>
-            </a:pPr>
-            <a:endParaRPr lang="de-DE" dirty="0"/>
-          </a:p>
-          <a:p>
-            <a:pPr marL="0" indent="0">
-              <a:buNone/>
-            </a:pPr>
-            <a:r>
-              <a:rPr lang="de-DE" dirty="0"/>
-              <a:t>wird </a:t>
-            </a:r>
-            <a:r>
-              <a:rPr lang="de-DE" b="1" dirty="0"/>
-              <a:t>pro Filiale </a:t>
-            </a:r>
-            <a:r>
-              <a:rPr lang="de-DE" dirty="0"/>
-              <a:t>angeboten – deckt also alle Kassen der Filiale ab (bis auf </a:t>
-            </a:r>
-            <a:r>
-              <a:rPr lang="de-DE" dirty="0" err="1"/>
+            <a:r>
+              <a:rPr lang="de-DE" noProof="0" dirty="0"/>
+              <a:t>Eine Kasse mit integrierter Middleware sendet Belegdaten an die Middleware. Zum Signieren der Daten arbeitet die Middleware mit einer TSE. Die Middleware sendet die Belegdaten und TSE Daten (TAR TSE) automatisch an das </a:t>
+            </a:r>
+            <a:r>
+              <a:rPr lang="de-DE" noProof="0" dirty="0" err="1"/>
               <a:t>POSArchiv</a:t>
             </a:r>
             <a:r>
-              <a:rPr lang="de-DE" dirty="0"/>
-              <a:t> – </a:t>
-            </a:r>
-            <a:r>
-              <a:rPr lang="de-DE" dirty="0" err="1"/>
-              <a:t>max</a:t>
-            </a:r>
-            <a:r>
-              <a:rPr lang="de-DE" dirty="0"/>
-              <a:t> 25 Kassen).</a:t>
-            </a:r>
-            <a:endParaRPr lang="de-DE" dirty="0">
-              <a:cs typeface="Calibri"/>
-            </a:endParaRPr>
-          </a:p>
-          <a:p>
-            <a:endParaRPr lang="en-US" dirty="0"/>
+              <a:rPr lang="de-DE" noProof="0" dirty="0"/>
+              <a:t>. Das </a:t>
+            </a:r>
+            <a:r>
+              <a:rPr lang="de-DE" noProof="0" dirty="0" err="1"/>
+              <a:t>POSArchiv</a:t>
+            </a:r>
+            <a:r>
+              <a:rPr lang="de-DE" noProof="0" dirty="0"/>
+              <a:t> sendet mit Hilfe von Server zu Server Übertragung die Daten automatisch an AKO (DSFinV-K + TAR) und an DATEV (DFKA Format). </a:t>
+            </a:r>
+          </a:p>
+          <a:p>
+            <a:r>
+              <a:rPr lang="de-DE" noProof="0" dirty="0"/>
+              <a:t>Der Betreiber einer Kasse ohne integrierter Middleware hat die Möglichkeit Daten manuell ins AKO hochzuladen (auch über die Händler-Website möglich). Alternativ kann das Kassensystem oder ein anderes Programm Daten über die AKO API ins AKO automatisch hochladen. Auch der Betreiber einer Kasse mit integrierter Middleware hat die Möglichkeit Daten manuell hochzuladen (PDF Dateien, z.B. Menükarten, Verfahrensdokumentation). Der Steuerberater hat Zugriff auf AKO Dateien indem der Betreiber Daten freigibt und dem Steuerberater einen Link mit Token für den Zugriff sendet. Um auf das </a:t>
+            </a:r>
+            <a:r>
+              <a:rPr lang="de-DE" noProof="0" dirty="0" err="1"/>
+              <a:t>POSArchiv</a:t>
+            </a:r>
+            <a:r>
+              <a:rPr lang="de-DE" noProof="0" dirty="0"/>
+              <a:t> Zugriff zu erlangen muss der Steuerberater im </a:t>
+            </a:r>
+            <a:r>
+              <a:rPr lang="de-DE" noProof="0" dirty="0" err="1"/>
+              <a:t>ft.Portal</a:t>
+            </a:r>
+            <a:r>
+              <a:rPr lang="de-DE" noProof="0" dirty="0"/>
+              <a:t> registriert werden (Rolle: Berater) und mit dem Betreiber verknüpft werden. Dieser kann daraufhin eine Datenfreigabe für den Berater aktivieren.</a:t>
+            </a:r>
+          </a:p>
+          <a:p>
+            <a:r>
+              <a:rPr lang="de-DE" noProof="0" dirty="0"/>
+              <a:t>In einem Hybridszenario (Kassen mit und Kassen ohne ft.Middleware) zum Beispiel können alle Daten der Kassen ohne ft.Middleware manuell oder per API ins AKO hochgeladen werden. Die Daten (Belegdaten + TSE TAR) der Kassen mit ft.Middleware werden automatisch hochgeladen, daraus entstehen die DSFinV-K und TSE TAR Files im </a:t>
+            </a:r>
+            <a:r>
+              <a:rPr lang="de-DE" noProof="0" dirty="0" err="1"/>
+              <a:t>POSArchiv</a:t>
+            </a:r>
+            <a:r>
+              <a:rPr lang="de-DE" noProof="0" dirty="0"/>
+              <a:t>, die dann ins AKO gelegt werden. So gelangen alle Daten der Filiale in diesem Hybridszenario im AKO.</a:t>
+            </a:r>
           </a:p>
         </p:txBody>
       </p:sp>
@@ -10127,7 +10344,7 @@
           <a:p>
             <a:fld id="{87FB5468-8034-4A81-91AF-9E789D7C7320}" type="slidenum">
               <a:rPr lang="de-DE" smtClean="0"/>
-              <a:t>15</a:t>
+              <a:t>13</a:t>
             </a:fld>
             <a:endParaRPr lang="de-DE"/>
           </a:p>
@@ -10136,7 +10353,7 @@
     </p:spTree>
     <p:extLst>
       <p:ext uri="{BB962C8B-B14F-4D97-AF65-F5344CB8AC3E}">
-        <p14:creationId xmlns:p14="http://schemas.microsoft.com/office/powerpoint/2010/main" val="18560965"/>
+        <p14:creationId xmlns:p14="http://schemas.microsoft.com/office/powerpoint/2010/main" val="3251830567"/>
       </p:ext>
     </p:extLst>
   </p:cSld>
@@ -10190,40 +10407,14 @@
           <a:bodyPr/>
           <a:lstStyle/>
           <a:p>
-            <a:pPr marL="0" indent="0">
-              <a:buNone/>
-            </a:pPr>
-            <a:r>
-              <a:rPr lang="de-DE" dirty="0"/>
-              <a:t> </a:t>
-            </a:r>
-            <a:r>
-              <a:rPr lang="de-DE" u="sng" dirty="0"/>
-              <a:t>Beinhaltet</a:t>
-            </a:r>
-            <a:r>
-              <a:rPr lang="de-DE" dirty="0"/>
-              <a:t>:</a:t>
-            </a:r>
-          </a:p>
-          <a:p>
-            <a:pPr marL="0" indent="0">
-              <a:buNone/>
-            </a:pPr>
-            <a:endParaRPr lang="de-DE" dirty="0"/>
-          </a:p>
-          <a:p>
             <a:pPr>
               <a:buFont typeface="Arial" panose="020B0604020202020204" pitchFamily="34" charset="0"/>
               <a:buChar char="•"/>
             </a:pPr>
             <a:r>
               <a:rPr lang="de-DE" dirty="0"/>
-              <a:t> POS Archiv</a:t>
-            </a:r>
-            <a:endParaRPr lang="de-DE" dirty="0">
-              <a:cs typeface="Calibri"/>
-            </a:endParaRPr>
+              <a:t> Kann nur für Kassen eingesetzt werden, die die fiskaltrust.Middleware benutzen.</a:t>
+            </a:r>
           </a:p>
           <a:p>
             <a:pPr>
@@ -10232,16 +10423,11 @@
             </a:pPr>
             <a:r>
               <a:rPr lang="de-DE" dirty="0"/>
-              <a:t> AKO (</a:t>
-            </a:r>
-            <a:r>
-              <a:rPr lang="de-DE" dirty="0" err="1"/>
-              <a:t>Audicon</a:t>
-            </a:r>
-            <a:r>
-              <a:rPr lang="de-DE" dirty="0"/>
-              <a:t> Kassenarchiv Online)</a:t>
-            </a:r>
+              <a:t> Sendet automatisiert Meldungen an das Finanzamt sobald erforderlich.</a:t>
+            </a:r>
+            <a:endParaRPr lang="de-DE" dirty="0">
+              <a:cs typeface="Calibri"/>
+            </a:endParaRPr>
           </a:p>
           <a:p>
             <a:pPr>
@@ -10250,101 +10436,52 @@
             </a:pPr>
             <a:r>
               <a:rPr lang="de-DE" dirty="0"/>
-              <a:t> und Automatische </a:t>
-            </a:r>
-            <a:r>
-              <a:rPr lang="de-DE" dirty="0" err="1"/>
-              <a:t>Finanzamtmeldungen</a:t>
-            </a:r>
-            <a:endParaRPr lang="de-DE" dirty="0"/>
+              <a:t>  Wird </a:t>
+            </a:r>
+            <a:r>
+              <a:rPr lang="de-DE" b="1" dirty="0"/>
+              <a:t>pro Kasse </a:t>
+            </a:r>
+            <a:r>
+              <a:rPr lang="de-DE" dirty="0"/>
+              <a:t>angeboten</a:t>
+            </a:r>
+            <a:endParaRPr lang="de-DE" dirty="0">
+              <a:cs typeface="Calibri" panose="020F0502020204030204"/>
+            </a:endParaRPr>
           </a:p>
           <a:p>
             <a:pPr>
               <a:buFont typeface="Arial" panose="020B0604020202020204" pitchFamily="34" charset="0"/>
               <a:buChar char="•"/>
             </a:pPr>
-            <a:r>
-              <a:rPr lang="de-DE" dirty="0"/>
-              <a:t> Je nach Wunsch: eine Hardware - oder Cloud TSE </a:t>
-            </a:r>
-            <a:r>
-              <a:rPr lang="de-DE" dirty="0" err="1"/>
-              <a:t>as</a:t>
-            </a:r>
-            <a:r>
-              <a:rPr lang="de-DE" dirty="0"/>
-              <a:t> a Service</a:t>
-            </a:r>
-          </a:p>
-          <a:p>
-            <a:pPr>
-              <a:buFont typeface="Arial" panose="020B0604020202020204" pitchFamily="34" charset="0"/>
-              <a:buChar char="•"/>
-            </a:pPr>
-            <a:endParaRPr lang="de-DE" dirty="0"/>
-          </a:p>
-          <a:p>
-            <a:pPr marL="0" indent="0">
-              <a:buNone/>
-            </a:pPr>
-            <a:r>
-              <a:rPr lang="de-DE" dirty="0"/>
-              <a:t>wird </a:t>
-            </a:r>
-            <a:r>
-              <a:rPr lang="de-DE" b="1" dirty="0"/>
-              <a:t>pro Filiale </a:t>
-            </a:r>
-            <a:r>
-              <a:rPr lang="de-DE" dirty="0"/>
-              <a:t>angeboten – deckt also alle Kassen der Filiale ab.</a:t>
-            </a:r>
-          </a:p>
-          <a:p>
-            <a:pPr marL="0" indent="0">
-              <a:buNone/>
-            </a:pPr>
-            <a:r>
-              <a:rPr lang="de-DE" dirty="0"/>
-              <a:t>- </a:t>
-            </a:r>
-            <a:r>
-              <a:rPr lang="de-DE" dirty="0" err="1"/>
-              <a:t>POSArchiv</a:t>
-            </a:r>
-            <a:r>
-              <a:rPr lang="de-DE" dirty="0"/>
-              <a:t> – </a:t>
-            </a:r>
-            <a:r>
-              <a:rPr lang="de-DE" dirty="0" err="1"/>
-              <a:t>max</a:t>
-            </a:r>
-            <a:r>
-              <a:rPr lang="de-DE" dirty="0"/>
-              <a:t> 25 Kassen</a:t>
-            </a:r>
-          </a:p>
-          <a:p>
-            <a:pPr marL="171450" indent="-171450">
-              <a:buFont typeface="Arial"/>
-              <a:buChar char="•"/>
-            </a:pPr>
-            <a:r>
-              <a:rPr lang="de-DE" dirty="0"/>
-              <a:t>Fair Use Limits für TSE-</a:t>
-            </a:r>
-            <a:r>
-              <a:rPr lang="de-DE" dirty="0" err="1"/>
-              <a:t>as</a:t>
-            </a:r>
-            <a:r>
-              <a:rPr lang="de-DE" dirty="0"/>
-              <a:t>-a-Service sind zu beachten (z.B.  maximal 150.000 Signaturen pro Kalendermonat zulässig, nur für einen Standort, Regelungen für den Tausch einer TSE)</a:t>
-            </a:r>
             <a:endParaRPr lang="de-DE" dirty="0">
-              <a:cs typeface="Calibri"/>
+              <a:cs typeface="Calibri" panose="020F0502020204030204"/>
             </a:endParaRPr>
+          </a:p>
+          <a:p>
+            <a:r>
+              <a:rPr lang="de-DE" dirty="0">
+                <a:cs typeface="Calibri" panose="020F0502020204030204"/>
+              </a:rPr>
+              <a:t>Vorteile:</a:t>
+            </a:r>
+          </a:p>
+          <a:p>
+            <a:r>
+              <a:rPr lang="de-DE" dirty="0">
+                <a:cs typeface="Calibri" panose="020F0502020204030204"/>
+              </a:rPr>
+              <a:t>- Zeit und Kosteneinsparung (z.B. Steuerberaterkosten)</a:t>
+            </a:r>
+          </a:p>
+          <a:p>
+            <a:r>
+              <a:rPr lang="de-DE" dirty="0">
+                <a:cs typeface="Calibri" panose="020F0502020204030204"/>
+              </a:rPr>
+              <a:t>- Automatisierter Prozess dadurch kommt kein Versäumnis oder Verspätung zu Stande</a:t>
+            </a:r>
           </a:p>
           <a:p>
             <a:endParaRPr lang="en-US" dirty="0"/>
@@ -10368,7 +10505,7 @@
           <a:p>
             <a:fld id="{87FB5468-8034-4A81-91AF-9E789D7C7320}" type="slidenum">
               <a:rPr lang="de-DE" smtClean="0"/>
-              <a:t>16</a:t>
+              <a:t>14</a:t>
             </a:fld>
             <a:endParaRPr lang="de-DE"/>
           </a:p>
@@ -10377,7 +10514,7 @@
     </p:spTree>
     <p:extLst>
       <p:ext uri="{BB962C8B-B14F-4D97-AF65-F5344CB8AC3E}">
-        <p14:creationId xmlns:p14="http://schemas.microsoft.com/office/powerpoint/2010/main" val="3866179784"/>
+        <p14:creationId xmlns:p14="http://schemas.microsoft.com/office/powerpoint/2010/main" val="4061718064"/>
       </p:ext>
     </p:extLst>
   </p:cSld>
@@ -10431,7 +10568,146 @@
           <a:bodyPr/>
           <a:lstStyle/>
           <a:p>
-            <a:endParaRPr lang="en-US" dirty="0"/>
+            <a:pPr marL="0" indent="0">
+              <a:buNone/>
+            </a:pPr>
+            <a:r>
+              <a:rPr lang="de-DE" noProof="0" dirty="0"/>
+              <a:t> </a:t>
+            </a:r>
+            <a:r>
+              <a:rPr lang="de-DE" u="sng" noProof="0" dirty="0"/>
+              <a:t>Beinhaltet</a:t>
+            </a:r>
+            <a:r>
+              <a:rPr lang="de-DE" noProof="0" dirty="0"/>
+              <a:t>:</a:t>
+            </a:r>
+          </a:p>
+          <a:p>
+            <a:pPr marL="0" indent="0">
+              <a:buNone/>
+            </a:pPr>
+            <a:endParaRPr lang="de-DE" noProof="0" dirty="0"/>
+          </a:p>
+          <a:p>
+            <a:pPr>
+              <a:buFont typeface="Arial" panose="020B0604020202020204" pitchFamily="34" charset="0"/>
+              <a:buChar char="•"/>
+            </a:pPr>
+            <a:r>
+              <a:rPr lang="de-DE" noProof="0" dirty="0"/>
+              <a:t> POS Archiv (</a:t>
+            </a:r>
+            <a:r>
+              <a:rPr lang="de-DE" noProof="0" dirty="0" err="1"/>
+              <a:t>max</a:t>
+            </a:r>
+            <a:r>
+              <a:rPr lang="de-DE" noProof="0" dirty="0"/>
+              <a:t> 25 Kassen)</a:t>
+            </a:r>
+            <a:endParaRPr lang="de-DE" noProof="0" dirty="0">
+              <a:cs typeface="Calibri"/>
+            </a:endParaRPr>
+          </a:p>
+          <a:p>
+            <a:pPr>
+              <a:buFont typeface="Arial" panose="020B0604020202020204" pitchFamily="34" charset="0"/>
+              <a:buChar char="•"/>
+            </a:pPr>
+            <a:r>
+              <a:rPr lang="de-DE" noProof="0" dirty="0"/>
+              <a:t> AKO (</a:t>
+            </a:r>
+            <a:r>
+              <a:rPr lang="de-DE" noProof="0" dirty="0" err="1"/>
+              <a:t>Audicon</a:t>
+            </a:r>
+            <a:r>
+              <a:rPr lang="de-DE" noProof="0" dirty="0"/>
+              <a:t> Kassenarchiv Online)</a:t>
+            </a:r>
+          </a:p>
+          <a:p>
+            <a:pPr>
+              <a:buFont typeface="Arial" panose="020B0604020202020204" pitchFamily="34" charset="0"/>
+              <a:buChar char="•"/>
+            </a:pPr>
+            <a:r>
+              <a:rPr lang="de-DE" noProof="0" dirty="0"/>
+              <a:t> und automatische </a:t>
+            </a:r>
+            <a:r>
+              <a:rPr lang="de-DE" noProof="0" dirty="0" err="1"/>
+              <a:t>Finanzamtmeldungen</a:t>
+            </a:r>
+            <a:endParaRPr lang="de-DE" noProof="0" dirty="0"/>
+          </a:p>
+          <a:p>
+            <a:pPr>
+              <a:buFont typeface="Arial" panose="020B0604020202020204" pitchFamily="34" charset="0"/>
+              <a:buChar char="•"/>
+            </a:pPr>
+            <a:endParaRPr lang="de-DE" noProof="0" dirty="0"/>
+          </a:p>
+          <a:p>
+            <a:pPr marL="0" indent="0">
+              <a:buNone/>
+            </a:pPr>
+            <a:r>
+              <a:rPr lang="de-DE" noProof="0" dirty="0"/>
+              <a:t>wird </a:t>
+            </a:r>
+            <a:r>
+              <a:rPr lang="de-DE" b="1" noProof="0" dirty="0"/>
+              <a:t>pro Filiale </a:t>
+            </a:r>
+            <a:r>
+              <a:rPr lang="de-DE" noProof="0" dirty="0"/>
+              <a:t>angeboten – deckt also alle Kassen der Filiale ab (eingeschränkt durch fair </a:t>
+            </a:r>
+            <a:r>
+              <a:rPr lang="de-DE" noProof="0" dirty="0" err="1"/>
+              <a:t>use</a:t>
+            </a:r>
+            <a:r>
+              <a:rPr lang="de-DE" noProof="0" dirty="0"/>
+              <a:t> </a:t>
+            </a:r>
+            <a:r>
+              <a:rPr lang="de-DE" noProof="0" dirty="0" err="1"/>
+              <a:t>policy</a:t>
+            </a:r>
+            <a:r>
+              <a:rPr lang="de-DE" noProof="0" dirty="0"/>
+              <a:t>).</a:t>
+            </a:r>
+            <a:endParaRPr lang="de-DE" noProof="0" dirty="0">
+              <a:cs typeface="Calibri"/>
+            </a:endParaRPr>
+          </a:p>
+          <a:p>
+            <a:r>
+              <a:rPr lang="de-DE" noProof="0" dirty="0"/>
+              <a:t>- Falls fair </a:t>
+            </a:r>
+            <a:r>
+              <a:rPr lang="de-DE" noProof="0" dirty="0" err="1"/>
+              <a:t>use</a:t>
+            </a:r>
+            <a:r>
+              <a:rPr lang="de-DE" noProof="0" dirty="0"/>
+              <a:t> </a:t>
+            </a:r>
+            <a:r>
+              <a:rPr lang="de-DE" noProof="0" dirty="0" err="1"/>
+              <a:t>policy</a:t>
+            </a:r>
+            <a:r>
+              <a:rPr lang="de-DE" noProof="0" dirty="0"/>
+              <a:t> nicht eingehalten werden kann, können zusätzliche virtuelle Outlets für die gleiche Filiale angelegt werden</a:t>
+            </a:r>
           </a:p>
         </p:txBody>
       </p:sp>
@@ -10452,7 +10728,7 @@
           <a:p>
             <a:fld id="{87FB5468-8034-4A81-91AF-9E789D7C7320}" type="slidenum">
               <a:rPr lang="de-DE" smtClean="0"/>
-              <a:t>17</a:t>
+              <a:t>15</a:t>
             </a:fld>
             <a:endParaRPr lang="de-DE"/>
           </a:p>
@@ -10461,7 +10737,7 @@
     </p:spTree>
     <p:extLst>
       <p:ext uri="{BB962C8B-B14F-4D97-AF65-F5344CB8AC3E}">
-        <p14:creationId xmlns:p14="http://schemas.microsoft.com/office/powerpoint/2010/main" val="10604364"/>
+        <p14:creationId xmlns:p14="http://schemas.microsoft.com/office/powerpoint/2010/main" val="18560965"/>
       </p:ext>
     </p:extLst>
   </p:cSld>
@@ -10515,108 +10791,159 @@
           <a:bodyPr/>
           <a:lstStyle/>
           <a:p>
-            <a:pPr marL="0" marR="0" lvl="0" indent="0" algn="l" defTabSz="914400" rtl="0" eaLnBrk="1" fontAlgn="auto" latinLnBrk="0" hangingPunct="1">
-              <a:lnSpc>
-                <a:spcPct val="100000"/>
-              </a:lnSpc>
-              <a:spcBef>
-                <a:spcPts val="0"/>
-              </a:spcBef>
-              <a:spcAft>
-                <a:spcPts val="0"/>
-              </a:spcAft>
-              <a:buClrTx/>
-              <a:buSzTx/>
-              <a:buFontTx/>
+            <a:pPr marL="0" indent="0">
               <a:buNone/>
-              <a:tabLst/>
-              <a:defRPr/>
             </a:pPr>
             <a:r>
-              <a:rPr lang="de-DE" sz="1200" dirty="0"/>
-              <a:t>Kassenbetreiber können manuell oder automatisiert über das Portal eingeladen werden. Zum automatisierten Einladen vieler Kassenbetreiber wird eine CSV Datei verwendet, die zu diesem Zweck im Portal importiert wird. </a:t>
-            </a:r>
-          </a:p>
-          <a:p>
-            <a:pPr marL="0" marR="0" lvl="0" indent="0" algn="l" defTabSz="914400" rtl="0" eaLnBrk="1" fontAlgn="auto" latinLnBrk="0" hangingPunct="1">
-              <a:lnSpc>
-                <a:spcPct val="100000"/>
-              </a:lnSpc>
-              <a:spcBef>
-                <a:spcPts val="0"/>
-              </a:spcBef>
-              <a:spcAft>
-                <a:spcPts val="0"/>
-              </a:spcAft>
-              <a:buClrTx/>
-              <a:buSzTx/>
-              <a:buFontTx/>
+              <a:rPr lang="de-DE" dirty="0"/>
+              <a:t> </a:t>
+            </a:r>
+            <a:r>
+              <a:rPr lang="de-DE" u="sng" dirty="0"/>
+              <a:t>Beinhaltet</a:t>
+            </a:r>
+            <a:r>
+              <a:rPr lang="de-DE" dirty="0"/>
+              <a:t>:</a:t>
+            </a:r>
+          </a:p>
+          <a:p>
+            <a:pPr marL="0" indent="0">
               <a:buNone/>
-              <a:tabLst/>
-              <a:defRPr/>
             </a:pPr>
-            <a:r>
-              <a:rPr lang="de-DE" sz="1200" dirty="0"/>
-              <a:t>Sobald die Einladung abgesetzt wurde, wird eine Einladungs-Email an den Kassenbetreiber gesendet. </a:t>
-            </a:r>
-          </a:p>
-          <a:p>
-            <a:pPr marL="0" marR="0" lvl="0" indent="0" algn="l" defTabSz="914400" rtl="0" eaLnBrk="1" fontAlgn="auto" latinLnBrk="0" hangingPunct="1">
-              <a:lnSpc>
-                <a:spcPct val="100000"/>
-              </a:lnSpc>
-              <a:spcBef>
-                <a:spcPts val="0"/>
-              </a:spcBef>
-              <a:spcAft>
-                <a:spcPts val="0"/>
-              </a:spcAft>
-              <a:buClrTx/>
-              <a:buSzTx/>
-              <a:buFontTx/>
-              <a:buNone/>
-              <a:tabLst/>
-              <a:defRPr/>
+            <a:endParaRPr lang="de-DE" dirty="0"/>
+          </a:p>
+          <a:p>
+            <a:pPr>
+              <a:buFont typeface="Arial" panose="020B0604020202020204" pitchFamily="34" charset="0"/>
+              <a:buChar char="•"/>
             </a:pPr>
             <a:r>
-              <a:rPr lang="de-DE" sz="1200" dirty="0"/>
-              <a:t>Dieser erhält daraufhin die Email mit Informationen und einem Email-Bestätigungs-Link.</a:t>
-            </a:r>
-          </a:p>
-          <a:p>
-            <a:pPr marL="0" marR="0" lvl="0" indent="0" algn="l" defTabSz="914400" rtl="0" eaLnBrk="1" fontAlgn="auto" latinLnBrk="0" hangingPunct="1">
-              <a:lnSpc>
-                <a:spcPct val="100000"/>
-              </a:lnSpc>
-              <a:spcBef>
-                <a:spcPts val="0"/>
-              </a:spcBef>
-              <a:spcAft>
-                <a:spcPts val="0"/>
-              </a:spcAft>
-              <a:buClrTx/>
-              <a:buSzTx/>
-              <a:buFontTx/>
-              <a:buNone/>
-              <a:tabLst/>
-              <a:defRPr/>
-            </a:pPr>
-            <a:r>
-              <a:rPr lang="de-DE" sz="1200" dirty="0"/>
-              <a:t>Der Betreiber drückt den Link und wird auf das fiskaltrust Portal weiter geleitet wo er seine Daten überprüfen und sein Passwort setzen kann. Im nächsten Schritt muss er den Kooperationsvertrag mit fiskaltrust digital unterzeichnen. </a:t>
-            </a:r>
-          </a:p>
-          <a:p>
-            <a:pPr>
-              <a:defRPr/>
-            </a:pPr>
-            <a:r>
-              <a:rPr lang="de-DE" sz="1200" dirty="0"/>
-              <a:t>Der Händler Zugriffsrechte für die sogenannte Surrogation Funktion anfordern. </a:t>
-            </a:r>
-            <a:endParaRPr lang="de-DE" sz="1200" strike="sngStrike" dirty="0">
+              <a:rPr lang="de-DE" dirty="0"/>
+              <a:t> POS Archiv</a:t>
+            </a:r>
+            <a:endParaRPr lang="de-DE" dirty="0">
               <a:cs typeface="Calibri"/>
             </a:endParaRPr>
+          </a:p>
+          <a:p>
+            <a:pPr>
+              <a:buFont typeface="Arial" panose="020B0604020202020204" pitchFamily="34" charset="0"/>
+              <a:buChar char="•"/>
+            </a:pPr>
+            <a:r>
+              <a:rPr lang="de-DE" dirty="0"/>
+              <a:t> AKO (</a:t>
+            </a:r>
+            <a:r>
+              <a:rPr lang="de-DE" dirty="0" err="1"/>
+              <a:t>Audicon</a:t>
+            </a:r>
+            <a:r>
+              <a:rPr lang="de-DE" dirty="0"/>
+              <a:t> Kassenarchiv Online)</a:t>
+            </a:r>
+          </a:p>
+          <a:p>
+            <a:pPr>
+              <a:buFont typeface="Arial" panose="020B0604020202020204" pitchFamily="34" charset="0"/>
+              <a:buChar char="•"/>
+            </a:pPr>
+            <a:r>
+              <a:rPr lang="de-DE" dirty="0"/>
+              <a:t> und Automatische </a:t>
+            </a:r>
+            <a:r>
+              <a:rPr lang="de-DE" dirty="0" err="1"/>
+              <a:t>Finanzamtmeldungen</a:t>
+            </a:r>
+            <a:endParaRPr lang="de-DE" dirty="0"/>
+          </a:p>
+          <a:p>
+            <a:pPr>
+              <a:buFont typeface="Arial" panose="020B0604020202020204" pitchFamily="34" charset="0"/>
+              <a:buChar char="•"/>
+            </a:pPr>
+            <a:r>
+              <a:rPr lang="de-DE" dirty="0"/>
+              <a:t> Je nach Wunsch: eine Hardware - oder Cloud TSE </a:t>
+            </a:r>
+            <a:r>
+              <a:rPr lang="de-DE" dirty="0" err="1"/>
+              <a:t>as</a:t>
+            </a:r>
+            <a:r>
+              <a:rPr lang="de-DE" dirty="0"/>
+              <a:t> a Service</a:t>
+            </a:r>
+          </a:p>
+          <a:p>
+            <a:pPr>
+              <a:buFont typeface="Arial" panose="020B0604020202020204" pitchFamily="34" charset="0"/>
+              <a:buChar char="•"/>
+            </a:pPr>
+            <a:endParaRPr lang="de-DE" dirty="0"/>
+          </a:p>
+          <a:p>
+            <a:pPr marL="0" indent="0">
+              <a:buNone/>
+            </a:pPr>
+            <a:r>
+              <a:rPr lang="de-DE" noProof="0" dirty="0"/>
+              <a:t>wird </a:t>
+            </a:r>
+            <a:r>
+              <a:rPr lang="de-DE" b="1" noProof="0" dirty="0"/>
+              <a:t>pro Filiale </a:t>
+            </a:r>
+            <a:r>
+              <a:rPr lang="de-DE" noProof="0" dirty="0"/>
+              <a:t>angeboten – deckt also alle Kassen der Filiale ab (eingeschränkt durch fair </a:t>
+            </a:r>
+            <a:r>
+              <a:rPr lang="de-DE" noProof="0" dirty="0" err="1"/>
+              <a:t>use</a:t>
+            </a:r>
+            <a:r>
+              <a:rPr lang="de-DE" noProof="0" dirty="0"/>
+              <a:t> </a:t>
+            </a:r>
+            <a:r>
+              <a:rPr lang="de-DE" noProof="0" dirty="0" err="1"/>
+              <a:t>policy</a:t>
+            </a:r>
+            <a:r>
+              <a:rPr lang="de-DE" noProof="0" dirty="0"/>
+              <a:t>).</a:t>
+            </a:r>
+            <a:endParaRPr lang="de-DE" noProof="0" dirty="0">
+              <a:cs typeface="Calibri"/>
+            </a:endParaRPr>
+          </a:p>
+          <a:p>
+            <a:r>
+              <a:rPr lang="de-DE" noProof="0" dirty="0"/>
+              <a:t>- Falls fair </a:t>
+            </a:r>
+            <a:r>
+              <a:rPr lang="de-DE" noProof="0" dirty="0" err="1"/>
+              <a:t>use</a:t>
+            </a:r>
+            <a:r>
+              <a:rPr lang="de-DE" noProof="0" dirty="0"/>
+              <a:t> </a:t>
+            </a:r>
+            <a:r>
+              <a:rPr lang="de-DE" noProof="0" dirty="0" err="1"/>
+              <a:t>policy</a:t>
+            </a:r>
+            <a:r>
+              <a:rPr lang="de-DE" noProof="0" dirty="0"/>
+              <a:t> nicht eingehalten werden kann, können zusätzliche virtuelle Outlets für die gleiche Filiale angelegt werden</a:t>
+            </a:r>
+          </a:p>
+          <a:p>
+            <a:endParaRPr lang="en-US" dirty="0"/>
           </a:p>
         </p:txBody>
       </p:sp>
@@ -10637,7 +10964,7 @@
           <a:p>
             <a:fld id="{87FB5468-8034-4A81-91AF-9E789D7C7320}" type="slidenum">
               <a:rPr lang="de-DE" smtClean="0"/>
-              <a:t>18</a:t>
+              <a:t>16</a:t>
             </a:fld>
             <a:endParaRPr lang="de-DE"/>
           </a:p>
@@ -10646,7 +10973,7 @@
     </p:spTree>
     <p:extLst>
       <p:ext uri="{BB962C8B-B14F-4D97-AF65-F5344CB8AC3E}">
-        <p14:creationId xmlns:p14="http://schemas.microsoft.com/office/powerpoint/2010/main" val="2591893138"/>
+        <p14:creationId xmlns:p14="http://schemas.microsoft.com/office/powerpoint/2010/main" val="3866179784"/>
       </p:ext>
     </p:extLst>
   </p:cSld>
@@ -10700,230 +11027,6 @@
           <a:bodyPr/>
           <a:lstStyle/>
           <a:p>
-            <a:pPr>
-              <a:defRPr/>
-            </a:pPr>
-            <a:r>
-              <a:rPr lang="de-DE" sz="1200" dirty="0">
-                <a:cs typeface="Calibri"/>
-              </a:rPr>
-              <a:t>Optimierungsmöglichkeit aufgrund des hohen Aufwands der Unterstützung von vielen Betreibern bei der Registrierung.</a:t>
-            </a:r>
-          </a:p>
-          <a:p>
-            <a:pPr>
-              <a:defRPr/>
-            </a:pPr>
-            <a:endParaRPr lang="de-DE" sz="1200" dirty="0">
-              <a:cs typeface="Calibri"/>
-            </a:endParaRPr>
-          </a:p>
-          <a:p>
-            <a:pPr>
-              <a:defRPr/>
-            </a:pPr>
-            <a:r>
-              <a:rPr lang="de-DE" sz="1200" dirty="0">
-                <a:cs typeface="Calibri"/>
-              </a:rPr>
-              <a:t>- Der Händler aktiviert die Funktionalität indem er die </a:t>
-            </a:r>
-            <a:r>
-              <a:rPr lang="de-DE" sz="1200" dirty="0" err="1">
-                <a:cs typeface="Calibri"/>
-              </a:rPr>
-              <a:t>zusäzliche</a:t>
-            </a:r>
-            <a:r>
-              <a:rPr lang="de-DE" sz="1200" dirty="0">
-                <a:cs typeface="Calibri"/>
-              </a:rPr>
-              <a:t> Rolle (</a:t>
-            </a:r>
-            <a:r>
-              <a:rPr lang="de-DE" dirty="0" err="1"/>
-              <a:t>KassenHändler</a:t>
-            </a:r>
-            <a:r>
-              <a:rPr lang="de-DE" dirty="0"/>
-              <a:t> Auto-Invitation (</a:t>
-            </a:r>
-            <a:r>
-              <a:rPr lang="de-DE" dirty="0" err="1"/>
-              <a:t>opt</a:t>
-            </a:r>
-            <a:r>
-              <a:rPr lang="de-DE" dirty="0"/>
-              <a:t>-in)) aktiviert, dabei muss er einen sog. </a:t>
-            </a:r>
-            <a:r>
-              <a:rPr lang="de-DE" dirty="0" err="1"/>
-              <a:t>Opt</a:t>
-            </a:r>
-            <a:r>
-              <a:rPr lang="de-DE" dirty="0"/>
-              <a:t>-In Vertrag unterzeichnen indem er versichert, dass er die Vollmacht der Betreiber hat um für diese im Rahmen der Fiskalisierung Verträge unterschreiben und Produkte kaufen zu können.</a:t>
-            </a:r>
-            <a:endParaRPr lang="de-DE" sz="1200" dirty="0">
-              <a:cs typeface="Calibri"/>
-            </a:endParaRPr>
-          </a:p>
-          <a:p>
-            <a:pPr>
-              <a:defRPr/>
-            </a:pPr>
-            <a:r>
-              <a:rPr lang="de-DE" sz="1200" dirty="0">
-                <a:cs typeface="Calibri"/>
-              </a:rPr>
-              <a:t>- Der Händler lädt die Kassenbetreiber über Masseneinladung ein. </a:t>
-            </a:r>
-          </a:p>
-          <a:p>
-            <a:pPr>
-              <a:defRPr/>
-            </a:pPr>
-            <a:r>
-              <a:rPr lang="de-DE" sz="1200" dirty="0">
-                <a:cs typeface="Calibri"/>
-              </a:rPr>
-              <a:t>- Konto des Kassenbetreibers wird erstellt</a:t>
-            </a:r>
-          </a:p>
-          <a:p>
-            <a:pPr>
-              <a:defRPr/>
-            </a:pPr>
-            <a:r>
-              <a:rPr lang="de-DE" sz="1200" dirty="0">
-                <a:cs typeface="Calibri"/>
-              </a:rPr>
-              <a:t>- Verknüpfung zw. Händler und Betreiber wird erstellt</a:t>
-            </a:r>
-          </a:p>
-          <a:p>
-            <a:pPr>
-              <a:defRPr/>
-            </a:pPr>
-            <a:r>
-              <a:rPr lang="de-DE" sz="1200" dirty="0">
-                <a:cs typeface="Calibri"/>
-              </a:rPr>
-              <a:t>- Volle Zugriffsrechte werden dem Händler zugeordnet</a:t>
-            </a:r>
-          </a:p>
-          <a:p>
-            <a:pPr>
-              <a:defRPr/>
-            </a:pPr>
-            <a:r>
-              <a:rPr lang="de-DE" sz="1200" dirty="0">
-                <a:cs typeface="Calibri"/>
-              </a:rPr>
-              <a:t>- Speichern der Nutzungsvereinbarung und des </a:t>
-            </a:r>
-            <a:r>
-              <a:rPr lang="de-DE" sz="1200" dirty="0" err="1">
-                <a:cs typeface="Calibri"/>
-              </a:rPr>
-              <a:t>Opt</a:t>
-            </a:r>
-            <a:r>
-              <a:rPr lang="de-DE" sz="1200" dirty="0">
-                <a:cs typeface="Calibri"/>
-              </a:rPr>
-              <a:t>-In Vertrag im Account des Betreibers.</a:t>
-            </a:r>
-          </a:p>
-          <a:p>
-            <a:pPr>
-              <a:defRPr/>
-            </a:pPr>
-            <a:r>
-              <a:rPr lang="de-DE" sz="1200" dirty="0">
-                <a:cs typeface="Calibri"/>
-              </a:rPr>
-              <a:t>- Der Kassenbetreiber erhält eine E-Mail mit benötigten Information + vom Händler in seinem Namen </a:t>
-            </a:r>
-            <a:r>
-              <a:rPr lang="de-DE" sz="1200" dirty="0" err="1">
-                <a:cs typeface="Calibri"/>
-              </a:rPr>
-              <a:t>unterschriebnen</a:t>
-            </a:r>
-            <a:r>
-              <a:rPr lang="de-DE" sz="1200" dirty="0">
-                <a:cs typeface="Calibri"/>
-              </a:rPr>
-              <a:t> Nutzungsvereinbarung + . </a:t>
-            </a:r>
-            <a:r>
-              <a:rPr lang="de-DE" sz="1200" dirty="0" err="1">
-                <a:cs typeface="Calibri"/>
-              </a:rPr>
-              <a:t>Opt</a:t>
-            </a:r>
-            <a:r>
-              <a:rPr lang="de-DE" sz="1200" dirty="0">
-                <a:cs typeface="Calibri"/>
-              </a:rPr>
-              <a:t>-In Vertrag + evtl. Zusätzliche PDF Dokumente die vom Händler </a:t>
-            </a:r>
-            <a:r>
-              <a:rPr lang="de-DE" sz="1200" dirty="0" err="1">
-                <a:cs typeface="Calibri"/>
-              </a:rPr>
-              <a:t>hohgeladen</a:t>
-            </a:r>
-            <a:r>
-              <a:rPr lang="de-DE" sz="1200" dirty="0">
-                <a:cs typeface="Calibri"/>
-              </a:rPr>
-              <a:t> wurden.</a:t>
-            </a:r>
-          </a:p>
-          <a:p>
-            <a:pPr>
-              <a:defRPr/>
-            </a:pPr>
-            <a:r>
-              <a:rPr lang="de-DE" sz="1200" dirty="0">
-                <a:cs typeface="Calibri"/>
-              </a:rPr>
-              <a:t>- Der Händler kann für den Kassenbetreiber alle Aufgaben durchführen </a:t>
-            </a:r>
-          </a:p>
-          <a:p>
-            <a:pPr>
-              <a:defRPr/>
-            </a:pPr>
-            <a:endParaRPr lang="de-DE" sz="1200" dirty="0">
-              <a:cs typeface="Calibri"/>
-            </a:endParaRPr>
-          </a:p>
-          <a:p>
-            <a:pPr>
-              <a:defRPr/>
-            </a:pPr>
-            <a:r>
-              <a:rPr lang="de-DE" sz="1200" dirty="0">
-                <a:cs typeface="Calibri"/>
-              </a:rPr>
-              <a:t>Vorteil:</a:t>
-            </a:r>
-          </a:p>
-          <a:p>
-            <a:pPr>
-              <a:defRPr/>
-            </a:pPr>
-            <a:r>
-              <a:rPr lang="de-DE" sz="1200" dirty="0">
-                <a:cs typeface="Calibri"/>
-              </a:rPr>
-              <a:t>- Steigerung der Effektivität, Zeiteinsparung</a:t>
-            </a:r>
-          </a:p>
-          <a:p>
             <a:endParaRPr lang="en-US" dirty="0"/>
           </a:p>
         </p:txBody>
@@ -10945,7 +11048,7 @@
           <a:p>
             <a:fld id="{87FB5468-8034-4A81-91AF-9E789D7C7320}" type="slidenum">
               <a:rPr lang="de-DE" smtClean="0"/>
-              <a:t>19</a:t>
+              <a:t>17</a:t>
             </a:fld>
             <a:endParaRPr lang="de-DE"/>
           </a:p>
@@ -10954,7 +11057,7 @@
     </p:spTree>
     <p:extLst>
       <p:ext uri="{BB962C8B-B14F-4D97-AF65-F5344CB8AC3E}">
-        <p14:creationId xmlns:p14="http://schemas.microsoft.com/office/powerpoint/2010/main" val="3754531947"/>
+        <p14:creationId xmlns:p14="http://schemas.microsoft.com/office/powerpoint/2010/main" val="10604364"/>
       </p:ext>
     </p:extLst>
   </p:cSld>
@@ -11008,144 +11111,129 @@
           <a:bodyPr/>
           <a:lstStyle/>
           <a:p>
-            <a:r>
-              <a:rPr lang="de-DE" dirty="0"/>
-              <a:t>Wirtschaftliche und technische Vorbereitung können unabhängig voneinander stattfinden. D.h. Entitlements können bereits im Vorfeld von fiskaltrust gekauft werden und an die Betreiber verkauft werden (siehe auch Bestellungsdeadlines der einzelnen Bundesländer). </a:t>
-            </a:r>
-            <a:endParaRPr lang="de-DE" dirty="0">
-              <a:cs typeface="Calibri" panose="020F0502020204030204"/>
-            </a:endParaRPr>
-          </a:p>
-          <a:p>
-            <a:endParaRPr lang="de-DE" dirty="0">
-              <a:cs typeface="Calibri" panose="020F0502020204030204"/>
-            </a:endParaRPr>
-          </a:p>
-          <a:p>
-            <a:r>
-              <a:rPr lang="de-DE" dirty="0" err="1">
-                <a:cs typeface="Calibri" panose="020F0502020204030204"/>
-              </a:rPr>
-              <a:t>Sales</a:t>
-            </a:r>
-            <a:r>
-              <a:rPr lang="de-DE" dirty="0">
-                <a:cs typeface="Calibri" panose="020F0502020204030204"/>
-              </a:rPr>
-              <a:t> Vorbereitung:</a:t>
-            </a:r>
-            <a:endParaRPr lang="de-DE" dirty="0"/>
-          </a:p>
-          <a:p>
-            <a:r>
-              <a:rPr lang="de-DE" dirty="0"/>
-              <a:t>Kassenhändler (Einkauf) kaufen Add-On Entitlements im </a:t>
-            </a:r>
-            <a:r>
-              <a:rPr lang="de-DE" dirty="0" err="1"/>
-              <a:t>ft.Shop</a:t>
-            </a:r>
-            <a:endParaRPr lang="de-DE" dirty="0"/>
-          </a:p>
-          <a:p>
-            <a:r>
-              <a:rPr lang="de-DE" dirty="0"/>
-              <a:t>Kassenhändler (</a:t>
-            </a:r>
-            <a:r>
-              <a:rPr lang="de-DE" dirty="0" err="1"/>
-              <a:t>Sales</a:t>
-            </a:r>
-            <a:r>
-              <a:rPr lang="de-DE" dirty="0"/>
-              <a:t>) verkaufen Add-On Produkte (z.B. Sorglos-Paket) an die Kassenbetreiber. Diese können über die Entitlements an die Betreiber zugewiesen werden.</a:t>
-            </a:r>
-          </a:p>
-          <a:p>
-            <a:endParaRPr lang="de-DE" dirty="0"/>
-          </a:p>
-          <a:p>
-            <a:r>
-              <a:rPr lang="de-DE" dirty="0">
-                <a:cs typeface="Calibri"/>
-              </a:rPr>
-              <a:t>Technische Vorbereitung:</a:t>
-            </a:r>
-            <a:endParaRPr lang="de-DE" dirty="0"/>
-          </a:p>
-          <a:p>
-            <a:r>
-              <a:rPr lang="de-DE" dirty="0"/>
-              <a:t>Kassenhersteller und Händler (Techniker) besprechen Rolloutszenarien, erstellen Konfigurationstemplates für den Massenrollout im </a:t>
-            </a:r>
-            <a:r>
-              <a:rPr lang="de-DE" dirty="0" err="1"/>
-              <a:t>ft.Portal</a:t>
-            </a:r>
-            <a:r>
-              <a:rPr lang="de-DE" dirty="0"/>
-              <a:t> und geben diese frei. Sie erscheinen daraufhin im </a:t>
-            </a:r>
-            <a:r>
-              <a:rPr lang="de-DE" dirty="0" err="1"/>
-              <a:t>ft.Shop</a:t>
-            </a:r>
-            <a:r>
-              <a:rPr lang="de-DE" dirty="0"/>
-              <a:t> des Kassenbetreibers.</a:t>
-            </a:r>
-          </a:p>
-          <a:p>
-            <a:r>
-              <a:rPr lang="de-DE" dirty="0"/>
-              <a:t>Kassenhändler (Techniker) installieren vor Ort beim Betreiber mit Hilfe der zuvor angelegten Templates. Beim Auschecken des Template im </a:t>
-            </a:r>
-            <a:r>
-              <a:rPr lang="de-DE" dirty="0" err="1"/>
-              <a:t>ft.Shop</a:t>
-            </a:r>
-            <a:r>
-              <a:rPr lang="de-DE" dirty="0"/>
-              <a:t> des Betreibers wird automatisch vom </a:t>
-            </a:r>
-            <a:r>
-              <a:rPr lang="de-DE" dirty="0" err="1"/>
-              <a:t>ft.Portal</a:t>
-            </a:r>
-            <a:r>
-              <a:rPr lang="de-DE" dirty="0"/>
-              <a:t> ein </a:t>
-            </a:r>
-            <a:r>
-              <a:rPr lang="de-DE" dirty="0" err="1"/>
-              <a:t>Konfigurationskontainer</a:t>
-            </a:r>
-            <a:r>
-              <a:rPr lang="de-DE" dirty="0"/>
-              <a:t> (</a:t>
-            </a:r>
-            <a:r>
-              <a:rPr lang="de-DE" dirty="0" err="1"/>
-              <a:t>CashBox</a:t>
-            </a:r>
-            <a:r>
-              <a:rPr lang="de-DE" dirty="0"/>
-              <a:t>) angelegt.</a:t>
-            </a:r>
-          </a:p>
-          <a:p>
-            <a:endParaRPr lang="de-DE" dirty="0"/>
-          </a:p>
-          <a:p>
-            <a:r>
-              <a:rPr lang="de-DE" dirty="0" err="1"/>
-              <a:t>Sales</a:t>
-            </a:r>
-            <a:r>
-              <a:rPr lang="de-DE" dirty="0"/>
-              <a:t>- und Technikvorbereitung können vom Kassenhändler unabhängig voneinander vorgenommen werden. D.h. wirtschaftlich kann das Geschäft mit fiskaltrust abgeschlossen werden bevor das genaue roll-out Szenario bekannt ist. Der Techniker kann dann die Entitlements umwandeln in eine Hardware-TSE-Lieferung direkt zum Betreiber oder auch in eine Cloud-TSE. Bei der Konfiguration / bei den Konfigurationstemplates kann das ebenfalls berücksichtigt werden.</a:t>
-            </a:r>
-            <a:endParaRPr lang="de-DE" dirty="0">
+            <a:pPr marL="0" marR="0" lvl="0" indent="0" algn="l" defTabSz="914400" rtl="0" eaLnBrk="1" fontAlgn="auto" latinLnBrk="0" hangingPunct="1">
+              <a:lnSpc>
+                <a:spcPct val="100000"/>
+              </a:lnSpc>
+              <a:spcBef>
+                <a:spcPts val="0"/>
+              </a:spcBef>
+              <a:spcAft>
+                <a:spcPts val="0"/>
+              </a:spcAft>
+              <a:buClrTx/>
+              <a:buSzTx/>
+              <a:buFontTx/>
+              <a:buNone/>
+              <a:tabLst/>
+              <a:defRPr/>
+            </a:pPr>
+            <a:r>
+              <a:rPr lang="de-DE" sz="1200" dirty="0"/>
+              <a:t>Um den Rollout vornehmen zu können und die gekauften Entitlements an die Betreiber zu übertragen und aktivieren müssen zuerst die Kassenbetreiber im fiskaltrust Portal registriert werden. </a:t>
+            </a:r>
+          </a:p>
+          <a:p>
+            <a:pPr marL="0" marR="0" lvl="0" indent="0" algn="l" defTabSz="914400" rtl="0" eaLnBrk="1" fontAlgn="auto" latinLnBrk="0" hangingPunct="1">
+              <a:lnSpc>
+                <a:spcPct val="100000"/>
+              </a:lnSpc>
+              <a:spcBef>
+                <a:spcPts val="0"/>
+              </a:spcBef>
+              <a:spcAft>
+                <a:spcPts val="0"/>
+              </a:spcAft>
+              <a:buClrTx/>
+              <a:buSzTx/>
+              <a:buFontTx/>
+              <a:buNone/>
+              <a:tabLst/>
+              <a:defRPr/>
+            </a:pPr>
+            <a:r>
+              <a:rPr lang="de-DE" sz="1200" dirty="0"/>
+              <a:t>Kassenbetreiber können manuell oder automatisiert über das Portal eingeladen werden. Zum automatisierten Einladen vieler Kassenbetreiber wird eine CSV Datei verwendet, die zu diesem Zweck im Portal importiert wird. Im Rahmen. Der Einladungskonfiguration werden die Zugriffsrechte des Kassenhändlers auf das Konto des Kassenbetreibers eingestellt.</a:t>
+            </a:r>
+          </a:p>
+          <a:p>
+            <a:pPr marL="0" marR="0" lvl="0" indent="0" algn="l" defTabSz="914400" rtl="0" eaLnBrk="1" fontAlgn="auto" latinLnBrk="0" hangingPunct="1">
+              <a:lnSpc>
+                <a:spcPct val="100000"/>
+              </a:lnSpc>
+              <a:spcBef>
+                <a:spcPts val="0"/>
+              </a:spcBef>
+              <a:spcAft>
+                <a:spcPts val="0"/>
+              </a:spcAft>
+              <a:buClrTx/>
+              <a:buSzTx/>
+              <a:buFontTx/>
+              <a:buNone/>
+              <a:tabLst/>
+              <a:defRPr/>
+            </a:pPr>
+            <a:r>
+              <a:rPr lang="de-DE" sz="1200" dirty="0"/>
+              <a:t>Sobald die Einladung abgesetzt wurde, wird eine Einladungs-Email an den Kassenbetreiber gesendet. </a:t>
+            </a:r>
+          </a:p>
+          <a:p>
+            <a:pPr marL="0" marR="0" lvl="0" indent="0" algn="l" defTabSz="914400" rtl="0" eaLnBrk="1" fontAlgn="auto" latinLnBrk="0" hangingPunct="1">
+              <a:lnSpc>
+                <a:spcPct val="100000"/>
+              </a:lnSpc>
+              <a:spcBef>
+                <a:spcPts val="0"/>
+              </a:spcBef>
+              <a:spcAft>
+                <a:spcPts val="0"/>
+              </a:spcAft>
+              <a:buClrTx/>
+              <a:buSzTx/>
+              <a:buFontTx/>
+              <a:buNone/>
+              <a:tabLst/>
+              <a:defRPr/>
+            </a:pPr>
+            <a:r>
+              <a:rPr lang="de-DE" sz="1200" dirty="0"/>
+              <a:t>Dieser erhält daraufhin die Email mit Informationen und einem Email-Bestätigungs-Link.</a:t>
+            </a:r>
+          </a:p>
+          <a:p>
+            <a:pPr marL="0" marR="0" lvl="0" indent="0" algn="l" defTabSz="914400" rtl="0" eaLnBrk="1" fontAlgn="auto" latinLnBrk="0" hangingPunct="1">
+              <a:lnSpc>
+                <a:spcPct val="100000"/>
+              </a:lnSpc>
+              <a:spcBef>
+                <a:spcPts val="0"/>
+              </a:spcBef>
+              <a:spcAft>
+                <a:spcPts val="0"/>
+              </a:spcAft>
+              <a:buClrTx/>
+              <a:buSzTx/>
+              <a:buFontTx/>
+              <a:buNone/>
+              <a:tabLst/>
+              <a:defRPr/>
+            </a:pPr>
+            <a:r>
+              <a:rPr lang="de-DE" sz="1200" dirty="0"/>
+              <a:t>Der Betreiber drückt den Link und wird auf das fiskaltrust Portal weiter geleitet wo er seine Daten überprüfen und sein Passwort setzen kann. Im nächsten Schritt muss er den Kooperationsvertrag mit fiskaltrust digital unterzeichnen. </a:t>
+            </a:r>
+          </a:p>
+          <a:p>
+            <a:pPr>
+              <a:defRPr/>
+            </a:pPr>
+            <a:r>
+              <a:rPr lang="de-DE" sz="1200" dirty="0"/>
+              <a:t>Der Händler kann nun über die Surrogate Funktion in den Account des Kassenbetreibers Switchen um den Rollout vorzunehmen.</a:t>
+            </a:r>
+            <a:endParaRPr lang="de-DE" sz="1200" strike="sngStrike" dirty="0">
               <a:cs typeface="Calibri"/>
             </a:endParaRPr>
           </a:p>
@@ -11168,7 +11256,7 @@
           <a:p>
             <a:fld id="{87FB5468-8034-4A81-91AF-9E789D7C7320}" type="slidenum">
               <a:rPr lang="de-DE" smtClean="0"/>
-              <a:t>20</a:t>
+              <a:t>18</a:t>
             </a:fld>
             <a:endParaRPr lang="de-DE"/>
           </a:p>
@@ -11177,7 +11265,7 @@
     </p:spTree>
     <p:extLst>
       <p:ext uri="{BB962C8B-B14F-4D97-AF65-F5344CB8AC3E}">
-        <p14:creationId xmlns:p14="http://schemas.microsoft.com/office/powerpoint/2010/main" val="4208554055"/>
+        <p14:creationId xmlns:p14="http://schemas.microsoft.com/office/powerpoint/2010/main" val="2591893138"/>
       </p:ext>
     </p:extLst>
   </p:cSld>
@@ -11257,27 +11345,11 @@
               <a:rPr lang="de-DE" sz="1200" dirty="0">
                 <a:cs typeface="Calibri"/>
               </a:rPr>
-              <a:t>- Der Händler aktiviert die Funktionalität indem er die </a:t>
-            </a:r>
-            <a:r>
-              <a:rPr lang="de-DE" sz="1200" dirty="0" err="1">
-                <a:cs typeface="Calibri"/>
-              </a:rPr>
-              <a:t>zusäzliche</a:t>
-            </a:r>
-            <a:r>
-              <a:rPr lang="de-DE" sz="1200" dirty="0">
-                <a:cs typeface="Calibri"/>
-              </a:rPr>
-              <a:t> Rolle (</a:t>
-            </a:r>
-            <a:r>
-              <a:rPr lang="de-DE" dirty="0" err="1"/>
-              <a:t>KassenHändler</a:t>
+              <a:t>- Der Händler aktiviert die Funktionalität indem er im Portal die zusätzliche Rolle (</a:t>
             </a:r>
             <a:r>
               <a:rPr lang="de-DE" dirty="0"/>
-              <a:t> Auto-Invitation (</a:t>
+              <a:t>KassenHändler Auto-Invitation (</a:t>
             </a:r>
             <a:r>
               <a:rPr lang="de-DE" dirty="0" err="1"/>
@@ -11374,19 +11446,7 @@
               <a:rPr lang="de-DE" sz="1200" dirty="0">
                 <a:cs typeface="Calibri"/>
               </a:rPr>
-              <a:t>- Der Kassenbetreiber erhält eine E-Mail mit benötigten Information + vom Händler in seinem Namen </a:t>
-            </a:r>
-            <a:r>
-              <a:rPr lang="de-DE" sz="1200" dirty="0" err="1">
-                <a:cs typeface="Calibri"/>
-              </a:rPr>
-              <a:t>unterschriebnen</a:t>
-            </a:r>
-            <a:r>
-              <a:rPr lang="de-DE" sz="1200" dirty="0">
-                <a:cs typeface="Calibri"/>
-              </a:rPr>
-              <a:t> Nutzungsvereinbarung + . </a:t>
+              <a:t>- Der Kassenbetreiber erhält eine E-Mail mit benötigten Information + vom Händler in seinem Namen unterschriebenen Nutzungsvereinbarung + . </a:t>
             </a:r>
             <a:r>
               <a:rPr lang="de-DE" sz="1200" dirty="0" err="1">
@@ -11398,19 +11458,7 @@
               <a:rPr lang="de-DE" sz="1200" dirty="0">
                 <a:cs typeface="Calibri"/>
               </a:rPr>
-              <a:t>-In Vertrag + evtl. Zusätzliche PDF Dokumente die vom Händler </a:t>
-            </a:r>
-            <a:r>
-              <a:rPr lang="de-DE" sz="1200" dirty="0" err="1">
-                <a:cs typeface="Calibri"/>
-              </a:rPr>
-              <a:t>hohgeladen</a:t>
-            </a:r>
-            <a:r>
-              <a:rPr lang="de-DE" sz="1200" dirty="0">
-                <a:cs typeface="Calibri"/>
-              </a:rPr>
-              <a:t> wurden.</a:t>
+              <a:t>-In Vertrag + evtl. Zusätzliche PDF Dokumente die vom Händler hochgeladen wurden.</a:t>
             </a:r>
           </a:p>
           <a:p>
@@ -11476,7 +11524,7 @@
           <a:p>
             <a:fld id="{87FB5468-8034-4A81-91AF-9E789D7C7320}" type="slidenum">
               <a:rPr lang="de-DE" smtClean="0"/>
-              <a:t>21</a:t>
+              <a:t>19</a:t>
             </a:fld>
             <a:endParaRPr lang="de-DE"/>
           </a:p>
@@ -11485,7 +11533,175 @@
     </p:spTree>
     <p:extLst>
       <p:ext uri="{BB962C8B-B14F-4D97-AF65-F5344CB8AC3E}">
-        <p14:creationId xmlns:p14="http://schemas.microsoft.com/office/powerpoint/2010/main" val="2308203706"/>
+        <p14:creationId xmlns:p14="http://schemas.microsoft.com/office/powerpoint/2010/main" val="3754531947"/>
+      </p:ext>
+    </p:extLst>
+  </p:cSld>
+  <p:clrMapOvr>
+    <a:masterClrMapping/>
+  </p:clrMapOvr>
+</p:notes>
+</file>
+
+<file path=ppt/notesSlides/notesSlide19.xml><?xml version="1.0" encoding="utf-8"?>
+<p:notes xmlns:a="http://schemas.openxmlformats.org/drawingml/2006/main" xmlns:r="http://schemas.openxmlformats.org/officeDocument/2006/relationships" xmlns:p="http://schemas.openxmlformats.org/presentationml/2006/main">
+  <p:cSld>
+    <p:spTree>
+      <p:nvGrpSpPr>
+        <p:cNvPr id="1" name=""/>
+        <p:cNvGrpSpPr/>
+        <p:nvPr/>
+      </p:nvGrpSpPr>
+      <p:grpSpPr>
+        <a:xfrm>
+          <a:off x="0" y="0"/>
+          <a:ext cx="0" cy="0"/>
+          <a:chOff x="0" y="0"/>
+          <a:chExt cx="0" cy="0"/>
+        </a:xfrm>
+      </p:grpSpPr>
+      <p:sp>
+        <p:nvSpPr>
+          <p:cNvPr id="2" name="Slide Image Placeholder 1"/>
+          <p:cNvSpPr>
+            <a:spLocks noGrp="1" noRot="1" noChangeAspect="1"/>
+          </p:cNvSpPr>
+          <p:nvPr>
+            <p:ph type="sldImg"/>
+          </p:nvPr>
+        </p:nvSpPr>
+        <p:spPr/>
+      </p:sp>
+      <p:sp>
+        <p:nvSpPr>
+          <p:cNvPr id="3" name="Notes Placeholder 2"/>
+          <p:cNvSpPr>
+            <a:spLocks noGrp="1"/>
+          </p:cNvSpPr>
+          <p:nvPr>
+            <p:ph type="body" idx="1"/>
+          </p:nvPr>
+        </p:nvSpPr>
+        <p:spPr/>
+        <p:txBody>
+          <a:bodyPr/>
+          <a:lstStyle/>
+          <a:p>
+            <a:r>
+              <a:rPr lang="de-DE" dirty="0" err="1">
+                <a:cs typeface="Calibri" panose="020F0502020204030204"/>
+              </a:rPr>
+              <a:t>Sales</a:t>
+            </a:r>
+            <a:r>
+              <a:rPr lang="de-DE" dirty="0">
+                <a:cs typeface="Calibri" panose="020F0502020204030204"/>
+              </a:rPr>
+              <a:t> und Technik planen den Bedarf.</a:t>
+            </a:r>
+          </a:p>
+          <a:p>
+            <a:endParaRPr lang="de-DE" dirty="0">
+              <a:cs typeface="Calibri" panose="020F0502020204030204"/>
+            </a:endParaRPr>
+          </a:p>
+          <a:p>
+            <a:r>
+              <a:rPr lang="de-DE" dirty="0" err="1">
+                <a:cs typeface="Calibri" panose="020F0502020204030204"/>
+              </a:rPr>
+              <a:t>Sales</a:t>
+            </a:r>
+            <a:r>
+              <a:rPr lang="de-DE" dirty="0">
+                <a:cs typeface="Calibri" panose="020F0502020204030204"/>
+              </a:rPr>
+              <a:t> Vorbereitung:</a:t>
+            </a:r>
+          </a:p>
+          <a:p>
+            <a:r>
+              <a:rPr lang="de-DE" dirty="0">
+                <a:cs typeface="Calibri" panose="020F0502020204030204"/>
+              </a:rPr>
+              <a:t>Rahmenvertrag mit fiskaltrust, je nach geplantem Bedarf</a:t>
+            </a:r>
+            <a:endParaRPr lang="de-DE" dirty="0"/>
+          </a:p>
+          <a:p>
+            <a:r>
+              <a:rPr lang="de-DE" dirty="0"/>
+              <a:t>Einkauf der Entitlements im ft.Shop</a:t>
+            </a:r>
+          </a:p>
+          <a:p>
+            <a:r>
+              <a:rPr lang="de-DE" dirty="0"/>
+              <a:t>Verkauf von fiskaltrust Produkten (z.B. Sorglos-Paket) an die Kassenbetreiber im Rahmen eigener Produkte oder Leistungen</a:t>
+            </a:r>
+          </a:p>
+          <a:p>
+            <a:endParaRPr lang="de-DE" dirty="0"/>
+          </a:p>
+          <a:p>
+            <a:r>
+              <a:rPr lang="de-DE" dirty="0">
+                <a:cs typeface="Calibri"/>
+              </a:rPr>
+              <a:t>Technische Vorbereitung:</a:t>
+            </a:r>
+            <a:endParaRPr lang="de-DE" dirty="0"/>
+          </a:p>
+          <a:p>
+            <a:r>
+              <a:rPr lang="de-DE" dirty="0"/>
+              <a:t>Kassenhersteller und Händler (Techniker) besprechen Rolloutszenarien, bereiten bei Bedarf Konfigurationstemplates für den Massenrollout vor und testen den Rollout (z.B. mit Pilotkunden)</a:t>
+            </a:r>
+          </a:p>
+          <a:p>
+            <a:endParaRPr lang="de-DE" dirty="0"/>
+          </a:p>
+          <a:p>
+            <a:r>
+              <a:rPr lang="de-DE" dirty="0"/>
+              <a:t>Rollout:</a:t>
+            </a:r>
+          </a:p>
+          <a:p>
+            <a:r>
+              <a:rPr lang="de-DE" dirty="0"/>
+              <a:t>Kassenhändler (Techniker) nehmen das Rollout der fiskaltrust Middleware und fiskaltrust Produkte beim Kassenbetreiber vor</a:t>
+            </a:r>
+          </a:p>
+        </p:txBody>
+      </p:sp>
+      <p:sp>
+        <p:nvSpPr>
+          <p:cNvPr id="4" name="Slide Number Placeholder 3"/>
+          <p:cNvSpPr>
+            <a:spLocks noGrp="1"/>
+          </p:cNvSpPr>
+          <p:nvPr>
+            <p:ph type="sldNum" sz="quarter" idx="5"/>
+          </p:nvPr>
+        </p:nvSpPr>
+        <p:spPr/>
+        <p:txBody>
+          <a:bodyPr/>
+          <a:lstStyle/>
+          <a:p>
+            <a:fld id="{87FB5468-8034-4A81-91AF-9E789D7C7320}" type="slidenum">
+              <a:rPr lang="de-DE" smtClean="0"/>
+              <a:t>20</a:t>
+            </a:fld>
+            <a:endParaRPr lang="de-DE"/>
+          </a:p>
+        </p:txBody>
+      </p:sp>
+    </p:spTree>
+    <p:extLst>
+      <p:ext uri="{BB962C8B-B14F-4D97-AF65-F5344CB8AC3E}">
+        <p14:creationId xmlns:p14="http://schemas.microsoft.com/office/powerpoint/2010/main" val="4208554055"/>
       </p:ext>
     </p:extLst>
   </p:cSld>
@@ -11570,6 +11786,90 @@
     <p:extLst>
       <p:ext uri="{BB962C8B-B14F-4D97-AF65-F5344CB8AC3E}">
         <p14:creationId xmlns:p14="http://schemas.microsoft.com/office/powerpoint/2010/main" val="3259080483"/>
+      </p:ext>
+    </p:extLst>
+  </p:cSld>
+  <p:clrMapOvr>
+    <a:masterClrMapping/>
+  </p:clrMapOvr>
+</p:notes>
+</file>
+
+<file path=ppt/notesSlides/notesSlide20.xml><?xml version="1.0" encoding="utf-8"?>
+<p:notes xmlns:a="http://schemas.openxmlformats.org/drawingml/2006/main" xmlns:r="http://schemas.openxmlformats.org/officeDocument/2006/relationships" xmlns:p="http://schemas.openxmlformats.org/presentationml/2006/main">
+  <p:cSld>
+    <p:spTree>
+      <p:nvGrpSpPr>
+        <p:cNvPr id="1" name=""/>
+        <p:cNvGrpSpPr/>
+        <p:nvPr/>
+      </p:nvGrpSpPr>
+      <p:grpSpPr>
+        <a:xfrm>
+          <a:off x="0" y="0"/>
+          <a:ext cx="0" cy="0"/>
+          <a:chOff x="0" y="0"/>
+          <a:chExt cx="0" cy="0"/>
+        </a:xfrm>
+      </p:grpSpPr>
+      <p:sp>
+        <p:nvSpPr>
+          <p:cNvPr id="2" name="Slide Image Placeholder 1"/>
+          <p:cNvSpPr>
+            <a:spLocks noGrp="1" noRot="1" noChangeAspect="1"/>
+          </p:cNvSpPr>
+          <p:nvPr>
+            <p:ph type="sldImg"/>
+          </p:nvPr>
+        </p:nvSpPr>
+        <p:spPr/>
+      </p:sp>
+      <p:sp>
+        <p:nvSpPr>
+          <p:cNvPr id="3" name="Notes Placeholder 2"/>
+          <p:cNvSpPr>
+            <a:spLocks noGrp="1"/>
+          </p:cNvSpPr>
+          <p:nvPr>
+            <p:ph type="body" idx="1"/>
+          </p:nvPr>
+        </p:nvSpPr>
+        <p:spPr/>
+        <p:txBody>
+          <a:bodyPr/>
+          <a:lstStyle/>
+          <a:p>
+            <a:endParaRPr lang="en-US" dirty="0"/>
+          </a:p>
+        </p:txBody>
+      </p:sp>
+      <p:sp>
+        <p:nvSpPr>
+          <p:cNvPr id="4" name="Slide Number Placeholder 3"/>
+          <p:cNvSpPr>
+            <a:spLocks noGrp="1"/>
+          </p:cNvSpPr>
+          <p:nvPr>
+            <p:ph type="sldNum" sz="quarter" idx="5"/>
+          </p:nvPr>
+        </p:nvSpPr>
+        <p:spPr/>
+        <p:txBody>
+          <a:bodyPr/>
+          <a:lstStyle/>
+          <a:p>
+            <a:fld id="{87FB5468-8034-4A81-91AF-9E789D7C7320}" type="slidenum">
+              <a:rPr lang="de-DE" smtClean="0"/>
+              <a:t>21</a:t>
+            </a:fld>
+            <a:endParaRPr lang="de-DE"/>
+          </a:p>
+        </p:txBody>
+      </p:sp>
+    </p:spTree>
+    <p:extLst>
+      <p:ext uri="{BB962C8B-B14F-4D97-AF65-F5344CB8AC3E}">
+        <p14:creationId xmlns:p14="http://schemas.microsoft.com/office/powerpoint/2010/main" val="2308203706"/>
       </p:ext>
     </p:extLst>
   </p:cSld>
@@ -11741,7 +12041,26 @@
           <a:bodyPr/>
           <a:lstStyle/>
           <a:p>
-            <a:endParaRPr lang="en-US" dirty="0"/>
+            <a:r>
+              <a:rPr lang="de-DE" noProof="0" dirty="0"/>
+              <a:t>Darstellung: Art der Verträge, Erklärung des Angebots (</a:t>
+            </a:r>
+            <a:r>
+              <a:rPr lang="de-DE" noProof="0" dirty="0" err="1"/>
+              <a:t>Hers</a:t>
+            </a:r>
+            <a:r>
+              <a:rPr lang="de-DE" noProof="0" dirty="0"/>
+              <a:t> -&gt;</a:t>
+            </a:r>
+            <a:r>
+              <a:rPr lang="de-DE" noProof="0" dirty="0" err="1"/>
+              <a:t>teller</a:t>
+            </a:r>
+            <a:r>
+              <a:rPr lang="de-DE" noProof="0" dirty="0"/>
+              <a:t> -&gt; SW -&gt; Händler -&gt; SW + HW + Service -&gt; Betreiber) =&gt; fiskaltrust Produkte werden über die Händler platziert</a:t>
+            </a:r>
           </a:p>
         </p:txBody>
       </p:sp>
@@ -11825,7 +12144,74 @@
           <a:bodyPr/>
           <a:lstStyle/>
           <a:p>
-            <a:endParaRPr lang="en-US" dirty="0"/>
+            <a:r>
+              <a:rPr lang="de-DE" noProof="0" dirty="0"/>
+              <a:t>Darstellung Support Flow (orange):</a:t>
+            </a:r>
+          </a:p>
+          <a:p>
+            <a:r>
+              <a:rPr lang="de-DE" noProof="0" dirty="0"/>
+              <a:t>Fiskaltrust unterstützt </a:t>
+            </a:r>
+            <a:r>
+              <a:rPr lang="de-DE" noProof="0" dirty="0" err="1"/>
+              <a:t>Kassenhersteller</a:t>
+            </a:r>
+            <a:r>
+              <a:rPr lang="de-DE" noProof="0" dirty="0"/>
+              <a:t> bei der Integration der fiskaltrust Middleware</a:t>
+            </a:r>
+          </a:p>
+          <a:p>
+            <a:r>
+              <a:rPr lang="de-DE" noProof="0" dirty="0"/>
+              <a:t>Fiskaltrust und </a:t>
+            </a:r>
+            <a:r>
+              <a:rPr lang="de-DE" noProof="0" dirty="0" err="1"/>
+              <a:t>Kassenhersteller</a:t>
+            </a:r>
+            <a:r>
+              <a:rPr lang="de-DE" noProof="0" dirty="0"/>
+              <a:t> unterstützen die Kassenhändler bezüglich dem Rollout und Einsatz der fiskaltrust Middleware und fiskaltrust Produkte</a:t>
+            </a:r>
+          </a:p>
+          <a:p>
+            <a:r>
+              <a:rPr lang="de-DE" noProof="0" dirty="0"/>
+              <a:t>Der Kassenhändler übernimmt die Betreuung der Kassenbetreiber, fiskaltrust leistet keinen direkten Support an die Kassenbetreiber</a:t>
+            </a:r>
+          </a:p>
+          <a:p>
+            <a:endParaRPr lang="de-DE" noProof="0" dirty="0"/>
+          </a:p>
+          <a:p>
+            <a:r>
+              <a:rPr lang="de-DE" noProof="0" dirty="0"/>
+              <a:t>Darstellung zum Einsatz der Produkte (blau + grün):</a:t>
+            </a:r>
+          </a:p>
+          <a:p>
+            <a:r>
+              <a:rPr lang="de-DE" noProof="0" dirty="0"/>
+              <a:t>Die Händler kaufen Entitlements von fiskaltrust</a:t>
+            </a:r>
+          </a:p>
+          <a:p>
+            <a:r>
+              <a:rPr lang="de-DE" noProof="0" dirty="0"/>
+              <a:t>Die Händler übertragen Entitlements an die Betreiber und aktivieren diese. </a:t>
+            </a:r>
+          </a:p>
+          <a:p>
+            <a:r>
+              <a:rPr lang="de-DE" noProof="0" dirty="0"/>
+              <a:t>Lieferungen von Hardware TSEs erfolgen je nach Wunsch direkt an den Betreiber oder an den Händler</a:t>
+            </a:r>
+          </a:p>
+          <a:p>
+            <a:endParaRPr lang="de-DE" noProof="0" dirty="0"/>
           </a:p>
         </p:txBody>
       </p:sp>
@@ -11909,148 +12295,6 @@
           <a:bodyPr/>
           <a:lstStyle/>
           <a:p>
-            <a:pPr>
-              <a:buFont typeface="Arial"/>
-              <a:buChar char="•"/>
-            </a:pPr>
-            <a:r>
-              <a:rPr lang="de-DE" dirty="0"/>
-              <a:t> Das Kassensystem kommuniziert mit der ft.Middleware über das </a:t>
-            </a:r>
-            <a:r>
-              <a:rPr lang="de-DE" dirty="0" err="1"/>
-              <a:t>iPOS</a:t>
-            </a:r>
-            <a:r>
-              <a:rPr lang="de-DE" dirty="0"/>
-              <a:t> Interface. </a:t>
-            </a:r>
-            <a:endParaRPr lang="de-DE" dirty="0">
-              <a:cs typeface="Calibri" panose="020F0502020204030204"/>
-            </a:endParaRPr>
-          </a:p>
-          <a:p>
-            <a:pPr>
-              <a:buFont typeface="Arial"/>
-              <a:buChar char="•"/>
-            </a:pPr>
-            <a:r>
-              <a:rPr lang="de-DE" dirty="0"/>
-              <a:t> Das </a:t>
-            </a:r>
-            <a:r>
-              <a:rPr lang="de-DE" dirty="0" err="1"/>
-              <a:t>iPOS</a:t>
-            </a:r>
-            <a:r>
-              <a:rPr lang="de-DE" dirty="0"/>
-              <a:t> Interface ist identisch für alle unterstützen Länder (Länderübergreifend).</a:t>
-            </a:r>
-            <a:endParaRPr lang="de-DE" dirty="0">
-              <a:cs typeface="Calibri"/>
-            </a:endParaRPr>
-          </a:p>
-          <a:p>
-            <a:pPr>
-              <a:buFont typeface="Arial"/>
-              <a:buChar char="•"/>
-            </a:pPr>
-            <a:r>
-              <a:rPr lang="de-DE" dirty="0"/>
-              <a:t> Das </a:t>
-            </a:r>
-            <a:r>
-              <a:rPr lang="de-DE" dirty="0" err="1"/>
-              <a:t>iPOS</a:t>
-            </a:r>
-            <a:r>
-              <a:rPr lang="de-DE" dirty="0"/>
-              <a:t> Interface ist über REST, </a:t>
-            </a:r>
-            <a:r>
-              <a:rPr lang="de-DE" dirty="0" err="1"/>
-              <a:t>gRPC</a:t>
-            </a:r>
-            <a:r>
-              <a:rPr lang="de-DE" dirty="0"/>
-              <a:t>, WCF, TCP-Stream und Serial-Stream erreichbar.</a:t>
-            </a:r>
-            <a:endParaRPr lang="de-DE" dirty="0">
-              <a:cs typeface="Calibri"/>
-            </a:endParaRPr>
-          </a:p>
-          <a:p>
-            <a:pPr>
-              <a:buFont typeface="Arial"/>
-              <a:buChar char="•"/>
-            </a:pPr>
-            <a:r>
-              <a:rPr lang="de-DE" dirty="0"/>
-              <a:t> Das </a:t>
-            </a:r>
-            <a:r>
-              <a:rPr lang="de-DE" dirty="0" err="1"/>
-              <a:t>iPOS</a:t>
-            </a:r>
-            <a:r>
-              <a:rPr lang="de-DE" dirty="0"/>
-              <a:t> Interface bietet 3 Schnittstellen-Methoden: </a:t>
-            </a:r>
-            <a:r>
-              <a:rPr lang="de-DE" b="1" dirty="0"/>
-              <a:t>echo</a:t>
-            </a:r>
-            <a:r>
-              <a:rPr lang="de-DE" dirty="0"/>
-              <a:t> (Verfügbarkeit prüfen), </a:t>
-            </a:r>
-            <a:r>
-              <a:rPr lang="de-DE" b="1" dirty="0" err="1"/>
-              <a:t>sign</a:t>
-            </a:r>
-            <a:r>
-              <a:rPr lang="de-DE" dirty="0"/>
-              <a:t> (Signieren der Belegdaten, Absetzen von Sonderbelegen), </a:t>
-            </a:r>
-            <a:r>
-              <a:rPr lang="de-DE" b="1" dirty="0" err="1"/>
-              <a:t>journal</a:t>
-            </a:r>
-            <a:r>
-              <a:rPr lang="de-DE" dirty="0"/>
-              <a:t> (Export von Daten)</a:t>
-            </a:r>
-            <a:endParaRPr lang="de-DE" dirty="0">
-              <a:cs typeface="Calibri"/>
-            </a:endParaRPr>
-          </a:p>
-          <a:p>
-            <a:pPr>
-              <a:buFont typeface="Arial"/>
-              <a:buChar char="•"/>
-            </a:pPr>
-            <a:r>
-              <a:rPr lang="de-DE" dirty="0"/>
-              <a:t> Die Requests werden im ft.SecurityMechanism bearbeitet. Dieser kümmert sich um die Erstellung der eindeutigen, fortlaufenden Belegnummer, um die Verkettung, Signierung und die Persistenz der Daten.</a:t>
-            </a:r>
-            <a:endParaRPr lang="de-DE" dirty="0">
-              <a:cs typeface="Calibri"/>
-            </a:endParaRPr>
-          </a:p>
-          <a:p>
-            <a:pPr>
-              <a:buFont typeface="Arial"/>
-              <a:buChar char="•"/>
-            </a:pPr>
-            <a:r>
-              <a:rPr lang="de-DE" dirty="0"/>
-              <a:t> Die SCU übernimmt die länderspezifische Implementierung der Sicherheitslösung (z.B. in Deutschland die Erstellung der Signaturen mit Hilfe einer TSE)</a:t>
-            </a:r>
-            <a:endParaRPr lang="de-DE" dirty="0">
-              <a:cs typeface="Calibri"/>
-            </a:endParaRPr>
-          </a:p>
-          <a:p>
             <a:endParaRPr lang="en-US" dirty="0"/>
           </a:p>
         </p:txBody>
@@ -12072,7 +12316,7 @@
           <a:p>
             <a:fld id="{87FB5468-8034-4A81-91AF-9E789D7C7320}" type="slidenum">
               <a:rPr lang="de-DE" smtClean="0"/>
-              <a:t>9</a:t>
+              <a:t>7</a:t>
             </a:fld>
             <a:endParaRPr lang="de-DE"/>
           </a:p>
@@ -12081,7 +12325,7 @@
     </p:spTree>
     <p:extLst>
       <p:ext uri="{BB962C8B-B14F-4D97-AF65-F5344CB8AC3E}">
-        <p14:creationId xmlns:p14="http://schemas.microsoft.com/office/powerpoint/2010/main" val="3991596796"/>
+        <p14:creationId xmlns:p14="http://schemas.microsoft.com/office/powerpoint/2010/main" val="4229573293"/>
       </p:ext>
     </p:extLst>
   </p:cSld>
@@ -12135,181 +12379,6 @@
           <a:bodyPr/>
           <a:lstStyle/>
           <a:p>
-            <a:pPr>
-              <a:buFont typeface="Arial" panose="020B0604020202020204" pitchFamily="34" charset="0"/>
-              <a:buChar char="•"/>
-            </a:pPr>
-            <a:r>
-              <a:rPr lang="de-DE" dirty="0"/>
-              <a:t> Kann nur für Kassen eingesetzt werden, die die fiskaltrust.Middleware benutzen.</a:t>
-            </a:r>
-          </a:p>
-          <a:p>
-            <a:pPr>
-              <a:buFont typeface="Arial" panose="020B0604020202020204" pitchFamily="34" charset="0"/>
-              <a:buChar char="•"/>
-            </a:pPr>
-            <a:r>
-              <a:rPr lang="de-DE" dirty="0"/>
-              <a:t> Sorgt für die revisionssichere Archivierung der Kassendaten und der TSE Daten.</a:t>
-            </a:r>
-            <a:endParaRPr lang="de-DE" dirty="0">
-              <a:cs typeface="Calibri"/>
-            </a:endParaRPr>
-          </a:p>
-          <a:p>
-            <a:pPr>
-              <a:buFont typeface="Arial" panose="020B0604020202020204" pitchFamily="34" charset="0"/>
-              <a:buChar char="•"/>
-            </a:pPr>
-            <a:r>
-              <a:rPr lang="de-DE" dirty="0"/>
-              <a:t> Die Daten werden automatisch, ohne zutun des Betreibers von der fiskaltrust.Middleware hochgeladen.</a:t>
-            </a:r>
-            <a:endParaRPr lang="de-DE" dirty="0">
-              <a:cs typeface="Calibri" panose="020F0502020204030204"/>
-            </a:endParaRPr>
-          </a:p>
-          <a:p>
-            <a:pPr>
-              <a:buFont typeface="Arial" panose="020B0604020202020204" pitchFamily="34" charset="0"/>
-              <a:buChar char="•"/>
-            </a:pPr>
-            <a:r>
-              <a:rPr lang="de-DE" dirty="0"/>
-              <a:t> Export: DSFinV-K Format, TSE TAR Files,  fiskaltrust Queue Items Journal und DFKA Format für die DATEV-Schnittstelle</a:t>
-            </a:r>
-          </a:p>
-          <a:p>
-            <a:pPr>
-              <a:buFont typeface="Arial" panose="020B0604020202020204" pitchFamily="34" charset="0"/>
-              <a:buChar char="•"/>
-            </a:pPr>
-            <a:r>
-              <a:rPr lang="de-DE" dirty="0">
-                <a:cs typeface="Calibri"/>
-              </a:rPr>
-              <a:t> Die Daten können über die DATEV Schnittstelle an DATEV automatisch, in regelmäßigen Abständen übertragen werden (im DFKA Format)</a:t>
-            </a:r>
-            <a:endParaRPr lang="de-DE" dirty="0"/>
-          </a:p>
-          <a:p>
-            <a:pPr>
-              <a:buFont typeface="Arial" panose="020B0604020202020204" pitchFamily="34" charset="0"/>
-              <a:buChar char="•"/>
-            </a:pPr>
-            <a:r>
-              <a:rPr lang="de-DE" dirty="0">
-                <a:cs typeface="Calibri"/>
-              </a:rPr>
-              <a:t> Die DSFinV-K und TAR Files können über die AKO API an AKO </a:t>
-            </a:r>
-            <a:r>
-              <a:rPr lang="de-DE" dirty="0"/>
-              <a:t>automatisch, in regelmäßigen Abständen </a:t>
-            </a:r>
-            <a:r>
-              <a:rPr lang="de-DE" dirty="0">
-                <a:cs typeface="Calibri"/>
-              </a:rPr>
-              <a:t>übertragen werden</a:t>
-            </a:r>
-          </a:p>
-          <a:p>
-            <a:pPr>
-              <a:buFont typeface="Arial" panose="020B0604020202020204" pitchFamily="34" charset="0"/>
-              <a:buChar char="•"/>
-            </a:pPr>
-            <a:r>
-              <a:rPr lang="de-DE" dirty="0"/>
-              <a:t> Wird </a:t>
-            </a:r>
-            <a:r>
-              <a:rPr lang="de-DE" b="1" dirty="0"/>
-              <a:t>pro Kasse </a:t>
-            </a:r>
-            <a:r>
-              <a:rPr lang="de-DE" dirty="0"/>
-              <a:t>(Queue) angeboten</a:t>
-            </a:r>
-          </a:p>
-          <a:p>
-            <a:endParaRPr lang="de-DE" dirty="0">
-              <a:cs typeface="Calibri" panose="020F0502020204030204"/>
-            </a:endParaRPr>
-          </a:p>
-          <a:p>
-            <a:pPr>
-              <a:buFont typeface="Arial" panose="020B0604020202020204" pitchFamily="34" charset="0"/>
-            </a:pPr>
-            <a:r>
-              <a:rPr lang="de-DE" dirty="0">
-                <a:cs typeface="Calibri" panose="020F0502020204030204"/>
-              </a:rPr>
-              <a:t>Vorteile: </a:t>
-            </a:r>
-            <a:endParaRPr lang="de-DE" dirty="0"/>
-          </a:p>
-          <a:p>
-            <a:pPr>
-              <a:buFont typeface="Arial" panose="020B0604020202020204" pitchFamily="34" charset="0"/>
-              <a:buChar char="•"/>
-            </a:pPr>
-            <a:r>
-              <a:rPr lang="de-DE" dirty="0"/>
-              <a:t> Nachweis der Ordnungsmäßigkeit gegenüber der Finanzverwaltung</a:t>
-            </a:r>
-            <a:endParaRPr lang="de-DE" dirty="0">
-              <a:cs typeface="Calibri" panose="020F0502020204030204"/>
-            </a:endParaRPr>
-          </a:p>
-          <a:p>
-            <a:pPr>
-              <a:buFont typeface="Arial" panose="020B0604020202020204" pitchFamily="34" charset="0"/>
-              <a:buChar char="•"/>
-            </a:pPr>
-            <a:r>
-              <a:rPr lang="de-DE" dirty="0"/>
-              <a:t> Lösung für begrenzten Speicherplatz in Kassensystem und/oder TSE</a:t>
-            </a:r>
-            <a:endParaRPr lang="de-DE" dirty="0">
-              <a:cs typeface="Calibri" panose="020F0502020204030204"/>
-            </a:endParaRPr>
-          </a:p>
-          <a:p>
-            <a:pPr>
-              <a:buFont typeface="Arial" panose="020B0604020202020204" pitchFamily="34" charset="0"/>
-              <a:buChar char="•"/>
-            </a:pPr>
-            <a:r>
-              <a:rPr lang="de-DE" dirty="0">
-                <a:cs typeface="Calibri" panose="020F0502020204030204"/>
-              </a:rPr>
-              <a:t> </a:t>
-            </a:r>
-            <a:r>
-              <a:rPr lang="de-DE" dirty="0"/>
-              <a:t>Vereinfachter Zugriff durch zentralisierte Datenhaltung</a:t>
-            </a:r>
-            <a:endParaRPr lang="de-DE" dirty="0">
-              <a:cs typeface="Calibri" panose="020F0502020204030204"/>
-            </a:endParaRPr>
-          </a:p>
-          <a:p>
-            <a:pPr>
-              <a:buFont typeface="Arial" panose="020B0604020202020204" pitchFamily="34" charset="0"/>
-              <a:buChar char="•"/>
-            </a:pPr>
-            <a:r>
-              <a:rPr lang="de-DE" dirty="0">
-                <a:cs typeface="Calibri" panose="020F0502020204030204"/>
-              </a:rPr>
-              <a:t> </a:t>
-            </a:r>
-            <a:r>
-              <a:rPr lang="de-DE" dirty="0"/>
-              <a:t>Möglicher Wegfall der Verpflichtung alte Kassensysteme bzw. TSEs über die Dauer der Aufbewahrungspflicht vorzuhalten. </a:t>
-            </a:r>
             <a:endParaRPr lang="en-US" dirty="0"/>
           </a:p>
         </p:txBody>
@@ -12331,7 +12400,7 @@
           <a:p>
             <a:fld id="{87FB5468-8034-4A81-91AF-9E789D7C7320}" type="slidenum">
               <a:rPr lang="de-DE" smtClean="0"/>
-              <a:t>10</a:t>
+              <a:t>8</a:t>
             </a:fld>
             <a:endParaRPr lang="de-DE"/>
           </a:p>
@@ -12340,7 +12409,7 @@
     </p:spTree>
     <p:extLst>
       <p:ext uri="{BB962C8B-B14F-4D97-AF65-F5344CB8AC3E}">
-        <p14:creationId xmlns:p14="http://schemas.microsoft.com/office/powerpoint/2010/main" val="826261873"/>
+        <p14:creationId xmlns:p14="http://schemas.microsoft.com/office/powerpoint/2010/main" val="264824229"/>
       </p:ext>
     </p:extLst>
   </p:cSld>
@@ -12395,83 +12464,50 @@
           <a:lstStyle/>
           <a:p>
             <a:pPr>
-              <a:buFont typeface="Arial" panose="020B0604020202020204" pitchFamily="34" charset="0"/>
+              <a:buFont typeface="Arial"/>
+              <a:buNone/>
+            </a:pPr>
+            <a:r>
+              <a:rPr lang="de-DE" dirty="0"/>
+              <a:t>Kurze Einführung in die Funktionsweise der Middleware </a:t>
+            </a:r>
+          </a:p>
+          <a:p>
+            <a:pPr>
+              <a:buFont typeface="Arial"/>
+              <a:buNone/>
+            </a:pPr>
+            <a:r>
+              <a:rPr lang="de-DE" dirty="0"/>
+              <a:t>-&gt; Kassensoftware kommuniziert mit der ausgerollten fiskaltrust Middleware Instanz über die länderübergreifende IPOS Schnittstelle</a:t>
+            </a:r>
+          </a:p>
+          <a:p>
+            <a:pPr>
+              <a:buFont typeface="Arial"/>
+              <a:buNone/>
+            </a:pPr>
+            <a:r>
+              <a:rPr lang="de-DE" dirty="0"/>
+              <a:t>-&gt; Die fiskaltrust Middleware benötigt in Deutschland eine TSE zum Signieren der Daten. </a:t>
+            </a:r>
+          </a:p>
+          <a:p>
+            <a:pPr>
+              <a:buFont typeface="Arial"/>
+              <a:buNone/>
+            </a:pPr>
+            <a:r>
+              <a:rPr lang="de-DE" dirty="0"/>
+              <a:t>-&gt; Die Daten werden von der fiskaltrust Middleware regelmäßig, automatisch in die fiskaltrust Cloud hochgeladen und stehen somit über die Archivierungslösung von fiskaltrust jederzeit zur Verfügung</a:t>
+            </a:r>
+          </a:p>
+          <a:p>
+            <a:pPr>
+              <a:buFont typeface="Arial"/>
               <a:buChar char="•"/>
             </a:pPr>
-            <a:r>
-              <a:rPr lang="de-DE" dirty="0"/>
-              <a:t> Kann nur für Kassen eingesetzt werden, die die fiskaltrust.Middleware benutzen.</a:t>
-            </a:r>
-          </a:p>
-          <a:p>
-            <a:pPr>
-              <a:buFont typeface="Arial" panose="020B0604020202020204" pitchFamily="34" charset="0"/>
-              <a:buChar char="•"/>
-            </a:pPr>
-            <a:r>
-              <a:rPr lang="de-DE" dirty="0"/>
-              <a:t> Sendet automatisiert Meldungen an das Finanzamt sobald erforderlich (Anmelden Kasse-&gt;TSE, Ummelden Kasse-&gt;TSE, Abmelden Kasse-&gt;TSE)</a:t>
-            </a:r>
-            <a:endParaRPr lang="de-DE" dirty="0">
-              <a:cs typeface="Calibri"/>
-            </a:endParaRPr>
-          </a:p>
-          <a:p>
-            <a:pPr>
-              <a:buFont typeface="Arial" panose="020B0604020202020204" pitchFamily="34" charset="0"/>
-              <a:buChar char="•"/>
-            </a:pPr>
-            <a:r>
-              <a:rPr lang="de-DE" dirty="0"/>
-              <a:t>  Wird </a:t>
-            </a:r>
-            <a:r>
-              <a:rPr lang="de-DE" b="1" dirty="0"/>
-              <a:t>pro Kasse </a:t>
-            </a:r>
-            <a:r>
-              <a:rPr lang="de-DE" dirty="0"/>
-              <a:t>angeboten</a:t>
-            </a:r>
-            <a:endParaRPr lang="de-DE" dirty="0">
-              <a:cs typeface="Calibri" panose="020F0502020204030204"/>
-            </a:endParaRPr>
-          </a:p>
-          <a:p>
-            <a:pPr>
-              <a:buFont typeface="Arial" panose="020B0604020202020204" pitchFamily="34" charset="0"/>
-              <a:buChar char="•"/>
-            </a:pPr>
-            <a:endParaRPr lang="de-DE" dirty="0">
-              <a:cs typeface="Calibri" panose="020F0502020204030204"/>
-            </a:endParaRPr>
-          </a:p>
-          <a:p>
-            <a:r>
-              <a:rPr lang="de-DE" dirty="0">
-                <a:cs typeface="Calibri" panose="020F0502020204030204"/>
-              </a:rPr>
-              <a:t>Vorteile:</a:t>
-            </a:r>
-          </a:p>
-          <a:p>
-            <a:r>
-              <a:rPr lang="de-DE" dirty="0">
-                <a:cs typeface="Calibri" panose="020F0502020204030204"/>
-              </a:rPr>
-              <a:t>- Zeit und Kosteneinsparung (z.B. Steuerberaterkosten)</a:t>
-            </a:r>
-          </a:p>
-          <a:p>
-            <a:r>
-              <a:rPr lang="de-DE" dirty="0">
-                <a:cs typeface="Calibri" panose="020F0502020204030204"/>
-              </a:rPr>
-              <a:t>- Automatisierter Prozess dadurch kommt kein Versäumnis oder Verspätung zu Stande</a:t>
-            </a:r>
-          </a:p>
-          <a:p>
-            <a:endParaRPr lang="en-US" dirty="0"/>
+            <a:endParaRPr lang="de-DE" dirty="0"/>
           </a:p>
         </p:txBody>
       </p:sp>
@@ -12492,7 +12528,7 @@
           <a:p>
             <a:fld id="{87FB5468-8034-4A81-91AF-9E789D7C7320}" type="slidenum">
               <a:rPr lang="de-DE" smtClean="0"/>
-              <a:t>11</a:t>
+              <a:t>9</a:t>
             </a:fld>
             <a:endParaRPr lang="de-DE"/>
           </a:p>
@@ -12501,7 +12537,7 @@
     </p:spTree>
     <p:extLst>
       <p:ext uri="{BB962C8B-B14F-4D97-AF65-F5344CB8AC3E}">
-        <p14:creationId xmlns:p14="http://schemas.microsoft.com/office/powerpoint/2010/main" val="756636306"/>
+        <p14:creationId xmlns:p14="http://schemas.microsoft.com/office/powerpoint/2010/main" val="3991596796"/>
       </p:ext>
     </p:extLst>
   </p:cSld>
@@ -12561,7 +12597,7 @@
             </a:pPr>
             <a:r>
               <a:rPr lang="de-DE" dirty="0"/>
-              <a:t> Unabhängig vom Einsatz der fiskaltrust.Middleware</a:t>
+              <a:t> Kann nur für Kassen eingesetzt werden, die die fiskaltrust.Middleware benutzen.</a:t>
             </a:r>
           </a:p>
           <a:p>
@@ -12571,16 +12607,11 @@
             </a:pPr>
             <a:r>
               <a:rPr lang="de-DE" dirty="0"/>
-              <a:t> Sorgt für die revisionssichere Archivierung </a:t>
-            </a:r>
-            <a:r>
-              <a:rPr lang="de-DE" b="1" dirty="0"/>
-              <a:t>manuell</a:t>
-            </a:r>
-            <a:r>
-              <a:rPr lang="de-DE" dirty="0"/>
-              <a:t> hochgeladener Daten (DSFinV-K, TSE TAR Files, PDF Dateien).</a:t>
-            </a:r>
+              <a:t> Sorgt für die revisionssichere Archivierung der Kassendaten und der TSE Daten.</a:t>
+            </a:r>
+            <a:endParaRPr lang="de-DE" dirty="0">
+              <a:cs typeface="Calibri"/>
+            </a:endParaRPr>
           </a:p>
           <a:p>
             <a:pPr>
@@ -12589,10 +12620,10 @@
             </a:pPr>
             <a:r>
               <a:rPr lang="de-DE" dirty="0"/>
-              <a:t> Bietet eine API zur Automatisierung des Upload</a:t>
+              <a:t> Die Daten werden automatisch, ohne zutun des Betreibers von der fiskaltrust.Middleware hochgeladen.</a:t>
             </a:r>
             <a:endParaRPr lang="de-DE" dirty="0">
-              <a:cs typeface="Calibri"/>
+              <a:cs typeface="Calibri" panose="020F0502020204030204"/>
             </a:endParaRPr>
           </a:p>
           <a:p>
@@ -12602,27 +12633,8 @@
             </a:pPr>
             <a:r>
               <a:rPr lang="de-DE" dirty="0"/>
-              <a:t> Die </a:t>
-            </a:r>
-            <a:r>
-              <a:rPr lang="de-DE" dirty="0" err="1"/>
-              <a:t>Uploadfunktionalität</a:t>
-            </a:r>
-            <a:r>
-              <a:rPr lang="de-DE" dirty="0"/>
-              <a:t> (File-Drop) ist auch als HTML Komponente leicht in die Webseite des Händlers integrierbar. Fiskaltrust stellt über </a:t>
-            </a:r>
-            <a:r>
-              <a:rPr lang="de-DE" dirty="0" err="1"/>
-              <a:t>github</a:t>
-            </a:r>
-            <a:r>
-              <a:rPr lang="de-DE" dirty="0"/>
-              <a:t> ein Source-Code Beispiel (HTML und JS) zur Verfügung. </a:t>
-            </a:r>
-            <a:endParaRPr lang="de-DE" dirty="0">
-              <a:cs typeface="Calibri" panose="020F0502020204030204"/>
-            </a:endParaRPr>
+              <a:t> Export: DSFinV-K Format, TSE TAR Files,  fiskaltrust Queue Items Journal und DFKA Format für die DATEV-Schnittstelle</a:t>
+            </a:r>
           </a:p>
           <a:p>
             <a:pPr>
@@ -12631,10 +12643,11 @@
             </a:pPr>
             <a:r>
               <a:rPr lang="de-DE" dirty="0">
-                <a:cs typeface="Calibri" panose="020F0502020204030204"/>
+                <a:cs typeface="Calibri"/>
               </a:rPr>
-              <a:t> DSFinV-K und TSE TAR Files können ohne Login/Authentifizierung hochgeladen werden. Hierbei erkennt das AKO aus dem Inhalt der Files wie diese zugeordnet müssen. </a:t>
-            </a:r>
+              <a:t> Die Daten können über die DATEV Schnittstelle an DATEV automatisch, in regelmäßigen Abständen übertragen werden (im DFKA Format)</a:t>
+            </a:r>
+            <a:endParaRPr lang="de-DE" dirty="0"/>
           </a:p>
           <a:p>
             <a:pPr>
@@ -12643,9 +12656,19 @@
             </a:pPr>
             <a:r>
               <a:rPr lang="de-DE" dirty="0">
-                <a:cs typeface="Calibri" panose="020F0502020204030204"/>
+                <a:cs typeface="Calibri"/>
               </a:rPr>
-              <a:t> Dadurch ist die Nutzung (der Upload) auch vor der Registrierung/Kauf möglich. Für den Zugriff auf die Daten muss das Produkt gekauft werden. </a:t>
+              <a:t> Die DSFinV-K und TAR Files können über die AKO API an AKO </a:t>
+            </a:r>
+            <a:r>
+              <a:rPr lang="de-DE" dirty="0"/>
+              <a:t>automatisch, in regelmäßigen Abständen </a:t>
+            </a:r>
+            <a:r>
+              <a:rPr lang="de-DE" dirty="0">
+                <a:cs typeface="Calibri"/>
+              </a:rPr>
+              <a:t>übertragen werden</a:t>
             </a:r>
           </a:p>
           <a:p>
@@ -12654,18 +12677,34 @@
               <a:buChar char="•"/>
             </a:pPr>
             <a:r>
+              <a:rPr lang="de-DE" dirty="0"/>
+              <a:t> Wird </a:t>
+            </a:r>
+            <a:r>
+              <a:rPr lang="de-DE" b="1" dirty="0"/>
+              <a:t>pro Kasse </a:t>
+            </a:r>
+            <a:r>
+              <a:rPr lang="de-DE" dirty="0"/>
+              <a:t>(Queue) angeboten</a:t>
+            </a:r>
+          </a:p>
+          <a:p>
+            <a:endParaRPr lang="de-DE" dirty="0">
+              <a:cs typeface="Calibri" panose="020F0502020204030204"/>
+            </a:endParaRPr>
+          </a:p>
+          <a:p>
+            <a:pPr>
+              <a:buFont typeface="Arial" panose="020B0604020202020204" pitchFamily="34" charset="0"/>
+            </a:pPr>
+            <a:r>
               <a:rPr lang="de-DE" dirty="0">
                 <a:cs typeface="Calibri" panose="020F0502020204030204"/>
               </a:rPr>
-              <a:t> Mandantenfähiger</a:t>
-            </a:r>
-            <a:r>
-              <a:rPr lang="de-DE" dirty="0"/>
-              <a:t> Zugriff über WEB Portal</a:t>
-            </a:r>
-            <a:endParaRPr lang="de-DE" dirty="0">
-              <a:cs typeface="Calibri"/>
-            </a:endParaRPr>
+              <a:t>Vorteile: </a:t>
+            </a:r>
+            <a:endParaRPr lang="de-DE" dirty="0"/>
           </a:p>
           <a:p>
             <a:pPr>
@@ -12674,8 +12713,11 @@
             </a:pPr>
             <a:r>
               <a:rPr lang="de-DE" dirty="0"/>
-              <a:t> Hochgeladene, externe DSFinV-K Dateien werden technisch validiert</a:t>
-            </a:r>
+              <a:t> Nachweis der Ordnungsmäßigkeit gegenüber der Finanzverwaltung</a:t>
+            </a:r>
+            <a:endParaRPr lang="de-DE" dirty="0">
+              <a:cs typeface="Calibri" panose="020F0502020204030204"/>
+            </a:endParaRPr>
           </a:p>
           <a:p>
             <a:pPr>
@@ -12684,10 +12726,10 @@
             </a:pPr>
             <a:r>
               <a:rPr lang="de-DE" dirty="0"/>
-              <a:t>  Kann auch für Kassen eingesetzt werden, die die fiskaltrust.Middleware benutzen um PDF Dateien revisionssicher zu Archivieren (Verfahrensdokumentation, Speisekarten, etc.)</a:t>
+              <a:t> Lösung für begrenzten Speicherplatz in Kassensystem und/oder TSE</a:t>
             </a:r>
             <a:endParaRPr lang="de-DE" dirty="0">
-              <a:cs typeface="Calibri"/>
+              <a:cs typeface="Calibri" panose="020F0502020204030204"/>
             </a:endParaRPr>
           </a:p>
           <a:p>
@@ -12696,140 +12738,35 @@
               <a:buChar char="•"/>
             </a:pPr>
             <a:r>
+              <a:rPr lang="de-DE" dirty="0">
+                <a:cs typeface="Calibri" panose="020F0502020204030204"/>
+              </a:rPr>
+              <a:t> </a:t>
+            </a:r>
+            <a:r>
               <a:rPr lang="de-DE" dirty="0"/>
-              <a:t> Wird </a:t>
-            </a:r>
-            <a:r>
-              <a:rPr lang="de-DE" b="1" dirty="0"/>
-              <a:t>pro Filiale </a:t>
-            </a:r>
-            <a:r>
-              <a:rPr lang="de-DE" dirty="0"/>
-              <a:t>angeboten - deckt also alle Kassen der Filiale ab</a:t>
-            </a:r>
+              <a:t>Vereinfachter Zugriff durch zentralisierte Datenhaltung</a:t>
+            </a:r>
+            <a:endParaRPr lang="de-DE" dirty="0">
+              <a:cs typeface="Calibri" panose="020F0502020204030204"/>
+            </a:endParaRPr>
           </a:p>
           <a:p>
             <a:pPr>
               <a:buFont typeface="Arial" panose="020B0604020202020204" pitchFamily="34" charset="0"/>
               <a:buChar char="•"/>
             </a:pPr>
-            <a:endParaRPr lang="de-DE" dirty="0">
-              <a:cs typeface="Calibri"/>
-            </a:endParaRPr>
-          </a:p>
-          <a:p>
             <a:r>
               <a:rPr lang="de-DE" dirty="0">
-                <a:cs typeface="Calibri"/>
+                <a:cs typeface="Calibri" panose="020F0502020204030204"/>
               </a:rPr>
-              <a:t>Vorteile:</a:t>
-            </a:r>
-          </a:p>
-          <a:p>
-            <a:pPr marL="171450" indent="-171450">
-              <a:buFont typeface="Arial,Sans-Serif"/>
-              <a:buChar char="•"/>
-            </a:pPr>
-            <a:r>
-              <a:rPr lang="de-DE" dirty="0">
-                <a:cs typeface="Calibri"/>
-              </a:rPr>
-              <a:t>Einfacher Upload der Daten</a:t>
-            </a:r>
-            <a:endParaRPr lang="de-DE" dirty="0"/>
-          </a:p>
-          <a:p>
-            <a:pPr marL="171450" indent="-171450">
-              <a:buFont typeface="Arial,Sans-Serif"/>
-              <a:buChar char="•"/>
-            </a:pPr>
-            <a:r>
-              <a:rPr lang="de-DE" dirty="0">
-                <a:cs typeface="Calibri"/>
-              </a:rPr>
-              <a:t>Händler-Branding und attraktiv in der Preisgestaltung</a:t>
-            </a:r>
-            <a:endParaRPr lang="de-DE" dirty="0"/>
-          </a:p>
-          <a:p>
-            <a:pPr marL="171450" indent="-171450">
-              <a:buFont typeface="Arial,Sans-Serif"/>
-              <a:buChar char="•"/>
-            </a:pPr>
-            <a:r>
-              <a:rPr lang="de-DE" dirty="0"/>
-              <a:t>Unabhängig von der eingesetzten </a:t>
-            </a:r>
-            <a:r>
-              <a:rPr lang="de-DE" dirty="0" err="1"/>
-              <a:t>Fiskalisierungslösung</a:t>
-            </a:r>
-            <a:endParaRPr lang="de-DE" dirty="0"/>
-          </a:p>
-          <a:p>
-            <a:pPr marL="171450" indent="-171450">
-              <a:buFont typeface="Arial,Sans-Serif"/>
-              <a:buChar char="•"/>
-            </a:pPr>
-            <a:r>
-              <a:rPr lang="de-DE" dirty="0">
-                <a:cs typeface="Calibri"/>
-              </a:rPr>
-              <a:t>Akzeptiert PDF Dateien (Verfahrensdokumentation, Speisekarten, etc.)</a:t>
-            </a:r>
-            <a:endParaRPr lang="de-DE" dirty="0"/>
-          </a:p>
-          <a:p>
-            <a:pPr marL="171450" indent="-171450">
-              <a:buFont typeface="Arial,Sans-Serif"/>
-              <a:buChar char="•"/>
-            </a:pPr>
-            <a:r>
-              <a:rPr lang="de-DE" dirty="0"/>
-              <a:t>Nachweis der Ordnungsmäßigkeit gegenüber der Finanzverwaltung</a:t>
-            </a:r>
-            <a:endParaRPr lang="de-DE" dirty="0">
-              <a:cs typeface="Calibri" panose="020F0502020204030204"/>
-            </a:endParaRPr>
-          </a:p>
-          <a:p>
-            <a:pPr marL="171450" indent="-171450">
-              <a:buFont typeface="Arial,Sans-Serif"/>
-              <a:buChar char="•"/>
-            </a:pPr>
-            <a:r>
-              <a:rPr lang="de-DE" dirty="0"/>
-              <a:t>Lösung für begrenzten Speicherplatz in Kassensystem und/oder TSE</a:t>
-            </a:r>
-            <a:endParaRPr lang="de-DE" dirty="0">
-              <a:cs typeface="Calibri" panose="020F0502020204030204"/>
-            </a:endParaRPr>
-          </a:p>
-          <a:p>
-            <a:pPr marL="171450" indent="-171450">
-              <a:buFont typeface="Arial,Sans-Serif"/>
-              <a:buChar char="•"/>
-            </a:pPr>
-            <a:r>
-              <a:rPr lang="de-DE" dirty="0"/>
-              <a:t>Vereinfachter Zugriff durch zentralisierte Datenhaltung</a:t>
-            </a:r>
-            <a:endParaRPr lang="de-DE" dirty="0">
-              <a:cs typeface="Calibri" panose="020F0502020204030204"/>
-            </a:endParaRPr>
-          </a:p>
-          <a:p>
-            <a:pPr marL="171450" indent="-171450">
-              <a:buFont typeface="Arial,Sans-Serif"/>
-              <a:buChar char="•"/>
-            </a:pPr>
+              <a:t> </a:t>
+            </a:r>
             <a:r>
               <a:rPr lang="de-DE" dirty="0"/>
               <a:t>Möglicher Wegfall der Verpflichtung alte Kassensysteme bzw. TSEs über die Dauer der Aufbewahrungspflicht vorzuhalten. </a:t>
             </a:r>
-            <a:endParaRPr lang="de-DE" dirty="0">
-              <a:cs typeface="Calibri"/>
-            </a:endParaRPr>
+            <a:endParaRPr lang="en-US" dirty="0"/>
           </a:p>
         </p:txBody>
       </p:sp>
@@ -12850,7 +12787,7 @@
           <a:p>
             <a:fld id="{87FB5468-8034-4A81-91AF-9E789D7C7320}" type="slidenum">
               <a:rPr lang="de-DE" smtClean="0"/>
-              <a:t>12</a:t>
+              <a:t>10</a:t>
             </a:fld>
             <a:endParaRPr lang="de-DE"/>
           </a:p>
@@ -12859,7 +12796,7 @@
     </p:spTree>
     <p:extLst>
       <p:ext uri="{BB962C8B-B14F-4D97-AF65-F5344CB8AC3E}">
-        <p14:creationId xmlns:p14="http://schemas.microsoft.com/office/powerpoint/2010/main" val="3771762237"/>
+        <p14:creationId xmlns:p14="http://schemas.microsoft.com/office/powerpoint/2010/main" val="826261873"/>
       </p:ext>
     </p:extLst>
   </p:cSld>
@@ -13206,7 +13143,7 @@
             <a:fld id="{F9CF9B13-D011-40B4-B116-4AFF51B22AA5}" type="datetime1">
               <a:rPr lang="de-DE" smtClean="0"/>
               <a:pPr/>
-              <a:t>13.10.20</a:t>
+              <a:t>25.05.21</a:t>
             </a:fld>
             <a:r>
               <a:rPr lang="de-DE"/>
@@ -13566,7 +13503,7 @@
             <a:fld id="{F9CF9B13-D011-40B4-B116-4AFF51B22AA5}" type="datetime1">
               <a:rPr lang="de-DE" smtClean="0"/>
               <a:pPr/>
-              <a:t>13.10.20</a:t>
+              <a:t>25.05.21</a:t>
             </a:fld>
             <a:r>
               <a:rPr lang="de-DE"/>
@@ -13788,7 +13725,7 @@
             <a:fld id="{EDCB950E-FDB1-4BA4-AE2E-92802DA17835}" type="datetime1">
               <a:rPr lang="de-DE" smtClean="0"/>
               <a:pPr/>
-              <a:t>13.10.20</a:t>
+              <a:t>25.05.21</a:t>
             </a:fld>
             <a:endParaRPr lang="de-DE"/>
           </a:p>
@@ -14246,7 +14183,7 @@
           <a:p>
             <a:fld id="{EA38D6C4-32A5-4B1B-BEC5-546FAB3E61DF}" type="datetime1">
               <a:rPr lang="de-DE" smtClean="0"/>
-              <a:t>13.10.20</a:t>
+              <a:t>25.05.21</a:t>
             </a:fld>
             <a:endParaRPr lang="de-DE"/>
           </a:p>
@@ -14686,7 +14623,7 @@
           <a:p>
             <a:r>
               <a:rPr lang="de-AT" sz="6600" dirty="0">
-                <a:latin typeface="Klavika" panose="02000803050000020004" pitchFamily="2" charset="0"/>
+                <a:latin typeface="Klavika Bd" panose="02000803050000020004" pitchFamily="2" charset="0"/>
               </a:rPr>
               <a:t>fiskaltrust für Kassenhändler</a:t>
             </a:r>
@@ -14758,7 +14695,7 @@
             <a:fld id="{F9CF9B13-D011-40B4-B116-4AFF51B22AA5}" type="datetime1">
               <a:rPr lang="de-DE"/>
               <a:pPr/>
-              <a:t>13.10.20</a:t>
+              <a:t>25.05.21</a:t>
             </a:fld>
             <a:r>
               <a:rPr lang="de-DE"/>
@@ -14831,7 +14768,7 @@
           <a:p>
             <a:r>
               <a:rPr lang="de-AT" dirty="0">
-                <a:latin typeface="Klavika Regular Plain" panose="02000506040000020004" pitchFamily="2" charset="77"/>
+                <a:latin typeface="KlavikaRegular-Plain" panose="02000506040000020004" pitchFamily="2" charset="77"/>
               </a:rPr>
               <a:t>Add-On Produkt POS Archiv</a:t>
             </a:r>
@@ -15011,7 +14948,7 @@
             <a:fld id="{F9CF9B13-D011-40B4-B116-4AFF51B22AA5}" type="datetime1">
               <a:rPr lang="de-DE" smtClean="0"/>
               <a:pPr/>
-              <a:t>13.10.20</a:t>
+              <a:t>25.05.21</a:t>
             </a:fld>
             <a:r>
               <a:rPr lang="de-DE"/>
@@ -15597,7 +15534,7 @@
           <a:p>
             <a:r>
               <a:rPr lang="de-AT" dirty="0">
-                <a:latin typeface="Klavika Regular Plain" panose="02000506040000020004" pitchFamily="2" charset="77"/>
+                <a:latin typeface="KlavikaRegular-Plain" panose="02000506040000020004" pitchFamily="2" charset="77"/>
               </a:rPr>
               <a:t>Add-On Produkt Finanzamtmeldungen</a:t>
             </a:r>
@@ -15664,7 +15601,7 @@
                 <a:latin typeface="Roboto" panose="02000000000000000000" pitchFamily="2" charset="0"/>
                 <a:ea typeface="Roboto" panose="02000000000000000000" pitchFamily="2" charset="0"/>
               </a:rPr>
-              <a:t>– 20 € / Jahr</a:t>
+              <a:t>– 20 € / Meldung</a:t>
             </a:r>
           </a:p>
         </p:txBody>
@@ -15697,7 +15634,7 @@
             <a:fld id="{F9CF9B13-D011-40B4-B116-4AFF51B22AA5}" type="datetime1">
               <a:rPr lang="de-DE" smtClean="0"/>
               <a:pPr/>
-              <a:t>13.10.20</a:t>
+              <a:t>25.05.21</a:t>
             </a:fld>
             <a:r>
               <a:rPr lang="de-DE"/>
@@ -15770,7 +15707,7 @@
           <a:p>
             <a:r>
               <a:rPr lang="de-AT" dirty="0">
-                <a:latin typeface="Klavika Regular Plain" panose="02000506040000020004" pitchFamily="2" charset="77"/>
+                <a:latin typeface="KlavikaRegular-Plain" panose="02000506040000020004" pitchFamily="2" charset="77"/>
               </a:rPr>
               <a:t>Einzelprodukt AKO</a:t>
             </a:r>
@@ -15940,7 +15877,7 @@
             <a:fld id="{F9CF9B13-D011-40B4-B116-4AFF51B22AA5}" type="datetime1">
               <a:rPr lang="de-DE" smtClean="0"/>
               <a:pPr/>
-              <a:t>13.10.20</a:t>
+              <a:t>25.05.21</a:t>
             </a:fld>
             <a:r>
               <a:rPr lang="de-DE"/>
@@ -16536,7 +16473,7 @@
           <a:p>
             <a:r>
               <a:rPr lang="de-AT" dirty="0">
-                <a:latin typeface="Klavika Regular Plain" panose="02000506040000020004" pitchFamily="2" charset="77"/>
+                <a:latin typeface="KlavikaRegular-Plain" panose="02000506040000020004" pitchFamily="2" charset="77"/>
               </a:rPr>
               <a:t>Archivierungsprodukte</a:t>
             </a:r>
@@ -16571,7 +16508,7 @@
             <a:fld id="{F9CF9B13-D011-40B4-B116-4AFF51B22AA5}" type="datetime1">
               <a:rPr lang="de-DE" smtClean="0"/>
               <a:pPr/>
-              <a:t>13.10.20</a:t>
+              <a:t>25.05.21</a:t>
             </a:fld>
             <a:r>
               <a:rPr lang="de-DE"/>
@@ -16588,7 +16525,7 @@
       </p:sp>
       <p:pic>
         <p:nvPicPr>
-          <p:cNvPr id="7" name="Picture 6" descr="Diagram&#10;&#10;Description automatically generated">
+          <p:cNvPr id="7" name="Picture 6">
             <a:extLst>
               <a:ext uri="{FF2B5EF4-FFF2-40B4-BE49-F238E27FC236}">
                 <a16:creationId xmlns:a16="http://schemas.microsoft.com/office/drawing/2014/main" id="{096A2AEE-EFE1-8542-A828-E124B9E923FB}"/>
@@ -16608,14 +16545,13 @@
               </a:ext>
             </a:extLst>
           </a:blip>
-          <a:stretch>
-            <a:fillRect/>
-          </a:stretch>
+          <a:srcRect/>
+          <a:stretch/>
         </p:blipFill>
         <p:spPr>
           <a:xfrm>
-            <a:off x="1384300" y="215900"/>
-            <a:ext cx="9423400" cy="6426200"/>
+            <a:off x="1456524" y="215900"/>
+            <a:ext cx="9278952" cy="6426200"/>
           </a:xfrm>
           <a:prstGeom prst="rect">
             <a:avLst/>
@@ -16680,7 +16616,7 @@
           <a:p>
             <a:r>
               <a:rPr lang="de-AT" dirty="0">
-                <a:latin typeface="Klavika Regular Plain" panose="02000506040000020004" pitchFamily="2" charset="77"/>
+                <a:latin typeface="KlavikaRegular-Plain" panose="02000506040000020004" pitchFamily="2" charset="77"/>
               </a:rPr>
               <a:t>Einzelprodukt TSE</a:t>
             </a:r>
@@ -16775,7 +16711,7 @@
             <a:fld id="{F9CF9B13-D011-40B4-B116-4AFF51B22AA5}" type="datetime1">
               <a:rPr lang="de-DE" smtClean="0"/>
               <a:pPr/>
-              <a:t>13.10.20</a:t>
+              <a:t>25.05.21</a:t>
             </a:fld>
             <a:r>
               <a:rPr lang="de-DE"/>
@@ -16848,7 +16784,7 @@
           <a:p>
             <a:r>
               <a:rPr lang="de-AT" dirty="0">
-                <a:latin typeface="Klavika Regular Plain" panose="02000506040000020004" pitchFamily="2" charset="77"/>
+                <a:latin typeface="KlavikaRegular-Plain" panose="02000506040000020004" pitchFamily="2" charset="77"/>
               </a:rPr>
               <a:t>Sorglos Paket ohne TSE</a:t>
             </a:r>
@@ -16932,11 +16868,39 @@
               <a:buNone/>
             </a:pPr>
             <a:r>
-              <a:rPr lang="de-AT" dirty="0">
+              <a:rPr lang="de-AT" sz="2000" dirty="0">
                 <a:latin typeface="Roboto" panose="02000000000000000000" pitchFamily="2" charset="0"/>
                 <a:ea typeface="Roboto" panose="02000000000000000000" pitchFamily="2" charset="0"/>
               </a:rPr>
-              <a:t>(* POS Archiv – max. 25 Kassen)</a:t>
+              <a:t>(* fair </a:t>
+            </a:r>
+            <a:r>
+              <a:rPr lang="de-AT" sz="2000" dirty="0" err="1">
+                <a:latin typeface="Roboto" panose="02000000000000000000" pitchFamily="2" charset="0"/>
+                <a:ea typeface="Roboto" panose="02000000000000000000" pitchFamily="2" charset="0"/>
+              </a:rPr>
+              <a:t>use</a:t>
+            </a:r>
+            <a:r>
+              <a:rPr lang="de-AT" sz="2000" dirty="0">
+                <a:latin typeface="Roboto" panose="02000000000000000000" pitchFamily="2" charset="0"/>
+                <a:ea typeface="Roboto" panose="02000000000000000000" pitchFamily="2" charset="0"/>
+              </a:rPr>
+              <a:t> </a:t>
+            </a:r>
+            <a:r>
+              <a:rPr lang="de-AT" sz="2000" dirty="0" err="1">
+                <a:latin typeface="Roboto" panose="02000000000000000000" pitchFamily="2" charset="0"/>
+                <a:ea typeface="Roboto" panose="02000000000000000000" pitchFamily="2" charset="0"/>
+              </a:rPr>
+              <a:t>policy</a:t>
+            </a:r>
+            <a:r>
+              <a:rPr lang="de-AT" sz="2000" dirty="0">
+                <a:latin typeface="Roboto" panose="02000000000000000000" pitchFamily="2" charset="0"/>
+                <a:ea typeface="Roboto" panose="02000000000000000000" pitchFamily="2" charset="0"/>
+              </a:rPr>
+              <a:t> beachten – max. 5 aktive Queues, 150.000 Signaturen/Monat – virtuelle Outlets möglich)</a:t>
             </a:r>
           </a:p>
         </p:txBody>
@@ -16969,7 +16933,7 @@
             <a:fld id="{F9CF9B13-D011-40B4-B116-4AFF51B22AA5}" type="datetime1">
               <a:rPr lang="de-DE" smtClean="0"/>
               <a:pPr/>
-              <a:t>13.10.20</a:t>
+              <a:t>25.05.21</a:t>
             </a:fld>
             <a:r>
               <a:rPr lang="de-DE"/>
@@ -17042,7 +17006,7 @@
           <a:p>
             <a:r>
               <a:rPr lang="de-AT" dirty="0">
-                <a:latin typeface="Klavika Regular Plain" panose="02000506040000020004" pitchFamily="2" charset="77"/>
+                <a:latin typeface="KlavikaRegular-Plain" panose="02000506040000020004" pitchFamily="2" charset="77"/>
               </a:rPr>
               <a:t>Sorglos Paket mit TSE-as-a-Service</a:t>
             </a:r>
@@ -17151,55 +17115,47 @@
                 <a:latin typeface="Roboto" panose="02000000000000000000" pitchFamily="2" charset="0"/>
                 <a:ea typeface="Roboto" panose="02000000000000000000" pitchFamily="2" charset="0"/>
               </a:rPr>
-              <a:t>* - 389 € </a:t>
-            </a:r>
-            <a:r>
-              <a:rPr lang="de-AT">
+              <a:t>* - 389 € / Jahr</a:t>
+            </a:r>
+          </a:p>
+          <a:p>
+            <a:pPr marL="360000" lvl="1" indent="0">
+              <a:buNone/>
+            </a:pPr>
+            <a:r>
+              <a:rPr lang="de-AT" sz="2000" dirty="0">
                 <a:latin typeface="Roboto" panose="02000000000000000000" pitchFamily="2" charset="0"/>
                 <a:ea typeface="Roboto" panose="02000000000000000000" pitchFamily="2" charset="0"/>
               </a:rPr>
-              <a:t>/ Jahr</a:t>
-            </a:r>
-            <a:endParaRPr lang="de-AT" dirty="0">
-              <a:latin typeface="Roboto" panose="02000000000000000000" pitchFamily="2" charset="0"/>
-              <a:ea typeface="Roboto" panose="02000000000000000000" pitchFamily="2" charset="0"/>
-            </a:endParaRPr>
-          </a:p>
-          <a:p>
-            <a:pPr marL="360000" lvl="1" indent="0">
-              <a:buNone/>
-            </a:pPr>
-            <a:r>
-              <a:rPr lang="de-AT" dirty="0">
+              <a:t>(*  fair </a:t>
+            </a:r>
+            <a:r>
+              <a:rPr lang="de-AT" sz="2000" dirty="0" err="1">
                 <a:latin typeface="Roboto" panose="02000000000000000000" pitchFamily="2" charset="0"/>
                 <a:ea typeface="Roboto" panose="02000000000000000000" pitchFamily="2" charset="0"/>
               </a:rPr>
-              <a:t>(* POS Archiv – max. 25 Kassen und </a:t>
-            </a:r>
-            <a:r>
-              <a:rPr lang="de-DE" dirty="0">
-                <a:latin typeface="Roboto"/>
-              </a:rPr>
-              <a:t>Fair Use Limits für TSE-</a:t>
-            </a:r>
-            <a:r>
-              <a:rPr lang="de-DE" dirty="0" err="1">
-                <a:latin typeface="Roboto"/>
-              </a:rPr>
-              <a:t>as</a:t>
-            </a:r>
-            <a:r>
-              <a:rPr lang="de-DE" dirty="0">
-                <a:latin typeface="Roboto"/>
-              </a:rPr>
-              <a:t>-a-Service beachten</a:t>
-            </a:r>
-            <a:r>
-              <a:rPr lang="de-AT" dirty="0">
+              <a:t>use</a:t>
+            </a:r>
+            <a:r>
+              <a:rPr lang="de-AT" sz="2000" dirty="0">
                 <a:latin typeface="Roboto" panose="02000000000000000000" pitchFamily="2" charset="0"/>
                 <a:ea typeface="Roboto" panose="02000000000000000000" pitchFamily="2" charset="0"/>
               </a:rPr>
-              <a:t>)</a:t>
+              <a:t> </a:t>
+            </a:r>
+            <a:r>
+              <a:rPr lang="de-AT" sz="2000" dirty="0" err="1">
+                <a:latin typeface="Roboto" panose="02000000000000000000" pitchFamily="2" charset="0"/>
+                <a:ea typeface="Roboto" panose="02000000000000000000" pitchFamily="2" charset="0"/>
+              </a:rPr>
+              <a:t>policy</a:t>
+            </a:r>
+            <a:r>
+              <a:rPr lang="de-AT" sz="2000" dirty="0">
+                <a:latin typeface="Roboto" panose="02000000000000000000" pitchFamily="2" charset="0"/>
+                <a:ea typeface="Roboto" panose="02000000000000000000" pitchFamily="2" charset="0"/>
+              </a:rPr>
+              <a:t> beachten – max. 5 aktive Queues, 150.000 Signaturen/Monat – virtuelle Outlets möglich)</a:t>
             </a:r>
           </a:p>
         </p:txBody>
@@ -17232,7 +17188,7 @@
             <a:fld id="{F9CF9B13-D011-40B4-B116-4AFF51B22AA5}" type="datetime1">
               <a:rPr lang="de-DE" smtClean="0"/>
               <a:pPr/>
-              <a:t>13.10.20</a:t>
+              <a:t>25.05.21</a:t>
             </a:fld>
             <a:r>
               <a:rPr lang="de-DE"/>
@@ -17305,7 +17261,7 @@
           <a:p>
             <a:r>
               <a:rPr lang="de-AT" dirty="0">
-                <a:latin typeface="Klavika Regular Plain" panose="02000506040000020004" pitchFamily="2" charset="77"/>
+                <a:latin typeface="KlavikaRegular-Plain" panose="02000506040000020004" pitchFamily="2" charset="77"/>
               </a:rPr>
               <a:t>Produkte kaufen und weiter verkaufen</a:t>
             </a:r>
@@ -17412,32 +17368,17 @@
                 <a:latin typeface="Roboto" panose="02000000000000000000" pitchFamily="2" charset="0"/>
                 <a:ea typeface="Roboto" panose="02000000000000000000" pitchFamily="2" charset="0"/>
               </a:rPr>
-              <a:t>Kauf der Entitlements über ft.Shop (</a:t>
-            </a:r>
-            <a:r>
-              <a:rPr lang="de-AT" dirty="0">
-                <a:latin typeface="Roboto" panose="02000000000000000000" pitchFamily="2" charset="0"/>
-                <a:ea typeface="Roboto" panose="02000000000000000000" pitchFamily="2" charset="0"/>
-                <a:hlinkClick r:id="rId3"/>
-              </a:rPr>
-              <a:t>Video</a:t>
-            </a:r>
+              <a:t>Kauf der Entitlements über ft.Shop</a:t>
+            </a:r>
+          </a:p>
+          <a:p>
+            <a:pPr lvl="1"/>
             <a:r>
               <a:rPr lang="de-AT" dirty="0">
                 <a:latin typeface="Roboto" panose="02000000000000000000" pitchFamily="2" charset="0"/>
                 <a:ea typeface="Roboto" panose="02000000000000000000" pitchFamily="2" charset="0"/>
               </a:rPr>
-              <a:t>)</a:t>
-            </a:r>
-          </a:p>
-          <a:p>
-            <a:pPr lvl="1"/>
-            <a:r>
-              <a:rPr lang="de-AT" dirty="0">
-                <a:latin typeface="Roboto" panose="02000000000000000000" pitchFamily="2" charset="0"/>
-                <a:ea typeface="Roboto" panose="02000000000000000000" pitchFamily="2" charset="0"/>
-              </a:rPr>
-              <a:t>Übertragung von Entitlements an Betreiber</a:t>
+              <a:t>Übertragung von Entitlements an Betreiber und Aktivierung</a:t>
             </a:r>
           </a:p>
         </p:txBody>
@@ -17470,7 +17411,7 @@
             <a:fld id="{F9CF9B13-D011-40B4-B116-4AFF51B22AA5}" type="datetime1">
               <a:rPr lang="de-DE" smtClean="0"/>
               <a:pPr/>
-              <a:t>13.10.20</a:t>
+              <a:t>25.05.21</a:t>
             </a:fld>
             <a:r>
               <a:rPr lang="de-DE"/>
@@ -17829,7 +17770,7 @@
           <a:p>
             <a:r>
               <a:rPr lang="de-AT" dirty="0">
-                <a:latin typeface="Klavika Regular Plain" panose="02000506040000020004" pitchFamily="2" charset="77"/>
+                <a:latin typeface="KlavikaRegular-Plain" panose="02000506040000020004" pitchFamily="2" charset="77"/>
               </a:rPr>
               <a:t>Einladung der Kassenbetreiber</a:t>
             </a:r>
@@ -17864,7 +17805,7 @@
             <a:fld id="{F9CF9B13-D011-40B4-B116-4AFF51B22AA5}" type="datetime1">
               <a:rPr lang="de-DE" smtClean="0"/>
               <a:pPr/>
-              <a:t>13.10.20</a:t>
+              <a:t>25.05.21</a:t>
             </a:fld>
             <a:r>
               <a:rPr lang="de-DE"/>
@@ -17894,7 +17835,7 @@
           <p:nvPr>
             <p:extLst>
               <p:ext uri="{D42A27DB-BD31-4B8C-83A1-F6EECF244321}">
-                <p14:modId xmlns:p14="http://schemas.microsoft.com/office/powerpoint/2010/main" val="712008025"/>
+                <p14:modId xmlns:p14="http://schemas.microsoft.com/office/powerpoint/2010/main" val="4239364899"/>
               </p:ext>
             </p:extLst>
           </p:nvPr>
@@ -17967,19 +17908,19 @@
           <a:p>
             <a:r>
               <a:rPr lang="de-AT" dirty="0">
-                <a:latin typeface="Klavika Regular Plain" panose="02000506040000020004" pitchFamily="2" charset="77"/>
+                <a:latin typeface="KlavikaRegular-Plain" panose="02000506040000020004" pitchFamily="2" charset="77"/>
               </a:rPr>
               <a:t>Auto-Einladung (</a:t>
             </a:r>
             <a:r>
               <a:rPr lang="de-AT" dirty="0" err="1">
-                <a:latin typeface="Klavika Regular Plain" panose="02000506040000020004" pitchFamily="2" charset="77"/>
+                <a:latin typeface="KlavikaRegular-Plain" panose="02000506040000020004" pitchFamily="2" charset="77"/>
               </a:rPr>
               <a:t>Opt</a:t>
             </a:r>
             <a:r>
               <a:rPr lang="de-AT" dirty="0">
-                <a:latin typeface="Klavika Regular Plain" panose="02000506040000020004" pitchFamily="2" charset="77"/>
+                <a:latin typeface="KlavikaRegular-Plain" panose="02000506040000020004" pitchFamily="2" charset="77"/>
               </a:rPr>
               <a:t>-In)</a:t>
             </a:r>
@@ -18111,7 +18052,7 @@
             <a:fld id="{F9CF9B13-D011-40B4-B116-4AFF51B22AA5}" type="datetime1">
               <a:rPr lang="de-DE" smtClean="0"/>
               <a:pPr/>
-              <a:t>13.10.20</a:t>
+              <a:t>25.05.21</a:t>
             </a:fld>
             <a:r>
               <a:rPr lang="de-DE"/>
@@ -18462,7 +18403,7 @@
           <a:p>
             <a:r>
               <a:rPr lang="de-AT" dirty="0">
-                <a:latin typeface="Klavika Regular Plain" panose="02000506040000020004" pitchFamily="2" charset="77"/>
+                <a:latin typeface="KlavikaRegular-Plain" panose="02000506040000020004" pitchFamily="2" charset="77"/>
               </a:rPr>
               <a:t>Agenda</a:t>
             </a:r>
@@ -18567,7 +18508,7 @@
             <a:fld id="{F9CF9B13-D011-40B4-B116-4AFF51B22AA5}" type="datetime1">
               <a:rPr lang="de-DE" smtClean="0"/>
               <a:pPr/>
-              <a:t>13.10.20</a:t>
+              <a:t>25.05.21</a:t>
             </a:fld>
             <a:r>
               <a:rPr lang="de-DE"/>
@@ -18640,7 +18581,7 @@
           <a:p>
             <a:r>
               <a:rPr lang="de-AT" dirty="0">
-                <a:latin typeface="Klavika Regular Plain" panose="02000506040000020004" pitchFamily="2" charset="77"/>
+                <a:latin typeface="KlavikaRegular-Plain" panose="02000506040000020004" pitchFamily="2" charset="77"/>
               </a:rPr>
               <a:t>Rollout Vorbereitung</a:t>
             </a:r>
@@ -18675,7 +18616,7 @@
             <a:fld id="{F9CF9B13-D011-40B4-B116-4AFF51B22AA5}" type="datetime1">
               <a:rPr lang="de-DE" smtClean="0"/>
               <a:pPr/>
-              <a:t>13.10.20</a:t>
+              <a:t>25.05.21</a:t>
             </a:fld>
             <a:r>
               <a:rPr lang="de-DE"/>
@@ -18692,7 +18633,7 @@
       </p:sp>
       <p:pic>
         <p:nvPicPr>
-          <p:cNvPr id="3" name="Picture 2" descr="A picture containing graphical user interface&#10;&#10;Description automatically generated">
+          <p:cNvPr id="3" name="Picture 2">
             <a:extLst>
               <a:ext uri="{FF2B5EF4-FFF2-40B4-BE49-F238E27FC236}">
                 <a16:creationId xmlns:a16="http://schemas.microsoft.com/office/drawing/2014/main" id="{C2C026D8-1958-0547-9726-5402E5D4D75D}"/>
@@ -18712,14 +18653,13 @@
               </a:ext>
             </a:extLst>
           </a:blip>
-          <a:stretch>
-            <a:fillRect/>
-          </a:stretch>
+          <a:srcRect/>
+          <a:stretch/>
         </p:blipFill>
         <p:spPr>
           <a:xfrm>
-            <a:off x="1796761" y="989656"/>
-            <a:ext cx="8598477" cy="5165951"/>
+            <a:off x="1935000" y="989656"/>
+            <a:ext cx="8321998" cy="5165951"/>
           </a:xfrm>
           <a:prstGeom prst="rect">
             <a:avLst/>
@@ -18784,7 +18724,7 @@
           <a:p>
             <a:r>
               <a:rPr lang="de-AT" dirty="0">
-                <a:latin typeface="Klavika Regular Plain" panose="02000506040000020004" pitchFamily="2" charset="77"/>
+                <a:latin typeface="KlavikaRegular-Plain" panose="02000506040000020004" pitchFamily="2" charset="77"/>
               </a:rPr>
               <a:t>Nächste Schritte</a:t>
             </a:r>
@@ -18828,7 +18768,7 @@
               <a:rPr lang="de-DE" dirty="0">
                 <a:hlinkClick r:id="rId3"/>
               </a:rPr>
-              <a:t>Getting Started für Kassenhändler</a:t>
+              <a:t>Get Started für Kassenhändler</a:t>
             </a:r>
             <a:endParaRPr lang="de-DE" dirty="0"/>
           </a:p>
@@ -18837,7 +18777,7 @@
               <a:rPr lang="de-DE" dirty="0">
                 <a:hlinkClick r:id="rId4"/>
               </a:rPr>
-              <a:t>Händlerpreisliste</a:t>
+              <a:t>Rolloutdokumentation</a:t>
             </a:r>
             <a:endParaRPr lang="de-DE" dirty="0"/>
           </a:p>
@@ -18871,7 +18811,7 @@
             <a:fld id="{F9CF9B13-D011-40B4-B116-4AFF51B22AA5}" type="datetime1">
               <a:rPr lang="de-DE" smtClean="0"/>
               <a:pPr/>
-              <a:t>13.10.20</a:t>
+              <a:t>25.05.21</a:t>
             </a:fld>
             <a:r>
               <a:rPr lang="de-DE"/>
@@ -18973,7 +18913,7 @@
             <a:fld id="{F9CF9B13-D011-40B4-B116-4AFF51B22AA5}" type="datetime1">
               <a:rPr lang="de-DE" smtClean="0"/>
               <a:pPr/>
-              <a:t>13.10.20</a:t>
+              <a:t>25.05.21</a:t>
             </a:fld>
             <a:r>
               <a:rPr lang="de-DE"/>
@@ -21520,7 +21460,7 @@
               <a:t>Rollen der fiskaltrust Partner</a:t>
             </a:r>
             <a:endParaRPr lang="de-AT" dirty="0">
-              <a:latin typeface="Klavika Regular Plain" panose="02000506040000020004" pitchFamily="2" charset="77"/>
+              <a:latin typeface="KlavikaRegular-Plain" panose="02000506040000020004" pitchFamily="2" charset="77"/>
             </a:endParaRPr>
           </a:p>
         </p:txBody>
@@ -21553,7 +21493,7 @@
             <a:fld id="{F9CF9B13-D011-40B4-B116-4AFF51B22AA5}" type="datetime1">
               <a:rPr lang="de-DE" smtClean="0"/>
               <a:pPr/>
-              <a:t>13.10.20</a:t>
+              <a:t>25.05.21</a:t>
             </a:fld>
             <a:r>
               <a:rPr lang="de-DE"/>
@@ -21662,7 +21602,7 @@
           <a:p>
             <a:r>
               <a:rPr lang="de-AT" dirty="0">
-                <a:latin typeface="Klavika Regular Plain" panose="02000506040000020004" pitchFamily="2" charset="77"/>
+                <a:latin typeface="KlavikaRegular-Plain" panose="02000506040000020004" pitchFamily="2" charset="77"/>
               </a:rPr>
               <a:t>fiskaltrust Verträge</a:t>
             </a:r>
@@ -21716,7 +21656,7 @@
                 <a:latin typeface="Roboto" panose="02000000000000000000" pitchFamily="2" charset="0"/>
                 <a:ea typeface="Roboto" panose="02000000000000000000" pitchFamily="2" charset="0"/>
               </a:rPr>
-              <a:t>Händler: Kooperationsvertrag und optional </a:t>
+              <a:t>Händler: Kooperationsvertrag und </a:t>
             </a:r>
             <a:r>
               <a:rPr lang="de-DE" dirty="0">
@@ -21768,7 +21708,7 @@
             <a:fld id="{F9CF9B13-D011-40B4-B116-4AFF51B22AA5}" type="datetime1">
               <a:rPr lang="de-DE" smtClean="0"/>
               <a:pPr/>
-              <a:t>13.10.20</a:t>
+              <a:t>25.05.21</a:t>
             </a:fld>
             <a:r>
               <a:rPr lang="de-DE"/>
@@ -21846,7 +21786,7 @@
               <a:t>Organisatorische Architektur</a:t>
             </a:r>
             <a:endParaRPr lang="de-AT" dirty="0">
-              <a:latin typeface="Klavika Regular Plain" panose="02000506040000020004" pitchFamily="2" charset="77"/>
+              <a:latin typeface="KlavikaRegular-Plain" panose="02000506040000020004" pitchFamily="2" charset="77"/>
             </a:endParaRPr>
           </a:p>
         </p:txBody>
@@ -21879,7 +21819,7 @@
             <a:fld id="{F9CF9B13-D011-40B4-B116-4AFF51B22AA5}" type="datetime1">
               <a:rPr lang="de-DE" smtClean="0"/>
               <a:pPr/>
-              <a:t>13.10.20</a:t>
+              <a:t>25.05.21</a:t>
             </a:fld>
             <a:r>
               <a:rPr lang="de-DE"/>
@@ -21993,7 +21933,7 @@
               <a:t>Organisatorische Architektur</a:t>
             </a:r>
             <a:endParaRPr lang="de-AT" dirty="0">
-              <a:latin typeface="Klavika Regular Plain" panose="02000506040000020004" pitchFamily="2" charset="77"/>
+              <a:latin typeface="KlavikaRegular-Plain" panose="02000506040000020004" pitchFamily="2" charset="77"/>
             </a:endParaRPr>
           </a:p>
         </p:txBody>
@@ -22026,7 +21966,7 @@
             <a:fld id="{F9CF9B13-D011-40B4-B116-4AFF51B22AA5}" type="datetime1">
               <a:rPr lang="de-DE" smtClean="0"/>
               <a:pPr/>
-              <a:t>13.10.20</a:t>
+              <a:t>25.05.21</a:t>
             </a:fld>
             <a:r>
               <a:rPr lang="de-DE"/>
@@ -22043,7 +21983,7 @@
       </p:sp>
       <p:pic>
         <p:nvPicPr>
-          <p:cNvPr id="3" name="Picture 2" descr="Diagram&#10;&#10;Description automatically generated">
+          <p:cNvPr id="3" name="Picture 2">
             <a:extLst>
               <a:ext uri="{FF2B5EF4-FFF2-40B4-BE49-F238E27FC236}">
                 <a16:creationId xmlns:a16="http://schemas.microsoft.com/office/drawing/2014/main" id="{6DF4CBCF-F39D-3040-BBBD-02E54CA4BA65}"/>
@@ -22063,14 +22003,13 @@
               </a:ext>
             </a:extLst>
           </a:blip>
-          <a:stretch>
-            <a:fillRect/>
-          </a:stretch>
+          <a:srcRect/>
+          <a:stretch/>
         </p:blipFill>
         <p:spPr>
           <a:xfrm>
             <a:off x="1132066" y="1051682"/>
-            <a:ext cx="9231133" cy="5272956"/>
+            <a:ext cx="9231132" cy="5272956"/>
           </a:xfrm>
           <a:prstGeom prst="rect">
             <a:avLst/>
@@ -22135,7 +22074,7 @@
           <a:p>
             <a:r>
               <a:rPr lang="de-AT" dirty="0">
-                <a:latin typeface="Klavika Regular Plain" panose="02000506040000020004" pitchFamily="2" charset="77"/>
+                <a:latin typeface="KlavikaRegular-Plain" panose="02000506040000020004" pitchFamily="2" charset="77"/>
               </a:rPr>
               <a:t>fiskaltrust Produkte</a:t>
             </a:r>
@@ -22181,7 +22120,7 @@
                 <a:latin typeface="Roboto" panose="02000000000000000000" pitchFamily="2" charset="0"/>
                 <a:ea typeface="Roboto" panose="02000000000000000000" pitchFamily="2" charset="0"/>
               </a:rPr>
-              <a:t>.Middleware als Basisprodukt</a:t>
+              <a:t>.Middleware als lizenzkostenfreies Basisprodukt</a:t>
             </a:r>
             <a:endParaRPr lang="de-AT" dirty="0">
               <a:latin typeface="Roboto" panose="02000000000000000000" pitchFamily="2" charset="0"/>
@@ -22317,7 +22256,7 @@
             <a:fld id="{F9CF9B13-D011-40B4-B116-4AFF51B22AA5}" type="datetime1">
               <a:rPr lang="de-DE" smtClean="0"/>
               <a:pPr/>
-              <a:t>13.10.20</a:t>
+              <a:t>25.05.21</a:t>
             </a:fld>
             <a:r>
               <a:rPr lang="de-DE"/>
@@ -22743,7 +22682,7 @@
           <a:p>
             <a:r>
               <a:rPr lang="de-AT" dirty="0">
-                <a:latin typeface="Klavika Regular Plain" panose="02000506040000020004" pitchFamily="2" charset="77"/>
+                <a:latin typeface="KlavikaRegular-Plain" panose="02000506040000020004" pitchFamily="2" charset="77"/>
               </a:rPr>
               <a:t>ft.Middleware als Basisprodukt</a:t>
             </a:r>
@@ -22818,7 +22757,30 @@
                 <a:latin typeface="Roboto"/>
                 <a:ea typeface="Roboto" panose="02000000000000000000" pitchFamily="2" charset="0"/>
               </a:rPr>
-              <a:t> Kassensystem integriert</a:t>
+              <a:t> </a:t>
+            </a:r>
+            <a:r>
+              <a:rPr lang="de-DE" dirty="0" err="1">
+                <a:latin typeface="Roboto"/>
+                <a:ea typeface="Roboto" panose="02000000000000000000" pitchFamily="2" charset="0"/>
+              </a:rPr>
+              <a:t>Kassensystem</a:t>
+            </a:r>
+            <a:r>
+              <a:rPr lang="de-DE" dirty="0">
+                <a:latin typeface="Roboto"/>
+                <a:ea typeface="Roboto" panose="02000000000000000000" pitchFamily="2" charset="0"/>
+              </a:rPr>
+              <a:t> integriert</a:t>
+            </a:r>
+          </a:p>
+          <a:p>
+            <a:r>
+              <a:rPr lang="de-DE" dirty="0">
+                <a:latin typeface="Roboto"/>
+                <a:ea typeface="Roboto" panose="02000000000000000000" pitchFamily="2" charset="0"/>
+              </a:rPr>
+              <a:t>Lizenzkostenfrei</a:t>
             </a:r>
             <a:endParaRPr lang="de-AT" dirty="0">
               <a:latin typeface="Roboto" panose="02000000000000000000" pitchFamily="2" charset="0"/>
@@ -22855,7 +22817,7 @@
             <a:fld id="{F9CF9B13-D011-40B4-B116-4AFF51B22AA5}" type="datetime1">
               <a:rPr lang="de-DE" smtClean="0"/>
               <a:pPr/>
-              <a:t>13.10.20</a:t>
+              <a:t>25.05.21</a:t>
             </a:fld>
             <a:r>
               <a:rPr lang="de-DE"/>
@@ -22928,7 +22890,7 @@
           <a:p>
             <a:r>
               <a:rPr lang="de-AT" dirty="0">
-                <a:latin typeface="Klavika Regular Plain" panose="02000506040000020004" pitchFamily="2" charset="77"/>
+                <a:latin typeface="KlavikaRegular-Plain" panose="02000506040000020004" pitchFamily="2" charset="77"/>
               </a:rPr>
               <a:t>ft.Middleware als Basisprodukt</a:t>
             </a:r>
@@ -22963,7 +22925,7 @@
             <a:fld id="{F9CF9B13-D011-40B4-B116-4AFF51B22AA5}" type="datetime1">
               <a:rPr lang="de-DE" smtClean="0"/>
               <a:pPr/>
-              <a:t>13.10.20</a:t>
+              <a:t>25.05.21</a:t>
             </a:fld>
             <a:r>
               <a:rPr lang="de-DE"/>
@@ -22980,7 +22942,7 @@
       </p:sp>
       <p:pic>
         <p:nvPicPr>
-          <p:cNvPr id="3" name="Picture 2" descr="Diagram&#10;&#10;Description automatically generated">
+          <p:cNvPr id="3" name="Picture 2">
             <a:extLst>
               <a:ext uri="{FF2B5EF4-FFF2-40B4-BE49-F238E27FC236}">
                 <a16:creationId xmlns:a16="http://schemas.microsoft.com/office/drawing/2014/main" id="{B39F02B7-4534-2F44-8BB0-300DB3363839}"/>
@@ -23000,14 +22962,13 @@
               </a:ext>
             </a:extLst>
           </a:blip>
-          <a:stretch>
-            <a:fillRect/>
-          </a:stretch>
+          <a:srcRect/>
+          <a:stretch/>
         </p:blipFill>
         <p:spPr>
           <a:xfrm>
-            <a:off x="777126" y="1922299"/>
-            <a:ext cx="10637748" cy="3647228"/>
+            <a:off x="1999949" y="1165604"/>
+            <a:ext cx="6466845" cy="4526792"/>
           </a:xfrm>
           <a:prstGeom prst="rect">
             <a:avLst/>
@@ -23618,18 +23579,18 @@
 </file>
 
 <file path=customXml/item1.xml><?xml version="1.0" encoding="utf-8"?>
-<p:properties xmlns:p="http://schemas.microsoft.com/office/2006/metadata/properties" xmlns:xsi="http://www.w3.org/2001/XMLSchema-instance" xmlns:pc="http://schemas.microsoft.com/office/infopath/2007/PartnerControls">
-  <documentManagement/>
-</p:properties>
-</file>
-
-<file path=customXml/item2.xml><?xml version="1.0" encoding="utf-8"?>
 <?mso-contentType ?>
 <FormTemplates xmlns="http://schemas.microsoft.com/sharepoint/v3/contenttype/forms">
   <Display>DocumentLibraryForm</Display>
   <Edit>DocumentLibraryForm</Edit>
   <New>DocumentLibraryForm</New>
 </FormTemplates>
+</file>
+
+<file path=customXml/item2.xml><?xml version="1.0" encoding="utf-8"?>
+<p:properties xmlns:p="http://schemas.microsoft.com/office/2006/metadata/properties" xmlns:xsi="http://www.w3.org/2001/XMLSchema-instance" xmlns:pc="http://schemas.microsoft.com/office/infopath/2007/PartnerControls">
+  <documentManagement/>
+</p:properties>
 </file>
 
 <file path=customXml/item3.xml><?xml version="1.0" encoding="utf-8"?>
@@ -23811,6 +23772,14 @@
 </file>
 
 <file path=customXml/itemProps1.xml><?xml version="1.0" encoding="utf-8"?>
+<ds:datastoreItem xmlns:ds="http://schemas.openxmlformats.org/officeDocument/2006/customXml" ds:itemID="{13D6CB1D-6628-4D5C-8ECC-C7DF45EC7E07}">
+  <ds:schemaRefs>
+    <ds:schemaRef ds:uri="http://schemas.microsoft.com/sharepoint/v3/contenttype/forms"/>
+  </ds:schemaRefs>
+</ds:datastoreItem>
+</file>
+
+<file path=customXml/itemProps2.xml><?xml version="1.0" encoding="utf-8"?>
 <ds:datastoreItem xmlns:ds="http://schemas.openxmlformats.org/officeDocument/2006/customXml" ds:itemID="{5AF2D8DD-AF33-4A08-A2E3-2004F6A6957D}">
   <ds:schemaRefs>
     <ds:schemaRef ds:uri="http://www.w3.org/XML/1998/namespace"/>
@@ -23823,14 +23792,6 @@
     <ds:schemaRef ds:uri="http://schemas.microsoft.com/office/2006/metadata/properties"/>
     <ds:schemaRef ds:uri="http://purl.org/dc/terms/"/>
     <ds:schemaRef ds:uri="http://schemas.openxmlformats.org/package/2006/metadata/core-properties"/>
-  </ds:schemaRefs>
-</ds:datastoreItem>
-</file>
-
-<file path=customXml/itemProps2.xml><?xml version="1.0" encoding="utf-8"?>
-<ds:datastoreItem xmlns:ds="http://schemas.openxmlformats.org/officeDocument/2006/customXml" ds:itemID="{13D6CB1D-6628-4D5C-8ECC-C7DF45EC7E07}">
-  <ds:schemaRefs>
-    <ds:schemaRef ds:uri="http://schemas.microsoft.com/sharepoint/v3/contenttype/forms"/>
   </ds:schemaRefs>
 </ds:datastoreItem>
 </file>

</xml_diff>